<commit_message>
Update 34359 – Software Defined Networking (SDN).pptx
added pictures and ending slide
ready for tomorrow
</commit_message>
<xml_diff>
--- a/34359 – Software Defined Networking (SDN).pptx
+++ b/34359 – Software Defined Networking (SDN).pptx
@@ -4,12 +4,15 @@
   <p:sldMasterIdLst>
     <p:sldMasterId id="2147483648" r:id="rId1"/>
   </p:sldMasterIdLst>
+  <p:notesMasterIdLst>
+    <p:notesMasterId r:id="rId20"/>
+  </p:notesMasterIdLst>
   <p:sldIdLst>
     <p:sldId id="257" r:id="rId2"/>
     <p:sldId id="297" r:id="rId3"/>
     <p:sldId id="298" r:id="rId4"/>
     <p:sldId id="299" r:id="rId5"/>
-    <p:sldId id="291" r:id="rId6"/>
+    <p:sldId id="313" r:id="rId6"/>
     <p:sldId id="300" r:id="rId7"/>
     <p:sldId id="301" r:id="rId8"/>
     <p:sldId id="303" r:id="rId9"/>
@@ -17,10 +20,12 @@
     <p:sldId id="304" r:id="rId11"/>
     <p:sldId id="305" r:id="rId12"/>
     <p:sldId id="306" r:id="rId13"/>
-    <p:sldId id="309" r:id="rId14"/>
-    <p:sldId id="307" r:id="rId15"/>
-    <p:sldId id="308" r:id="rId16"/>
-    <p:sldId id="310" r:id="rId17"/>
+    <p:sldId id="311" r:id="rId14"/>
+    <p:sldId id="312" r:id="rId15"/>
+    <p:sldId id="309" r:id="rId16"/>
+    <p:sldId id="307" r:id="rId17"/>
+    <p:sldId id="308" r:id="rId18"/>
+    <p:sldId id="314" r:id="rId19"/>
   </p:sldIdLst>
   <p:sldSz cx="12192000" cy="6858000"/>
   <p:notesSz cx="6858000" cy="9144000"/>
@@ -130,7 +135,7 @@
 <file path=ppt/revisionInfo.xml><?xml version="1.0" encoding="utf-8"?>
 <p1510:revInfo xmlns:a="http://schemas.openxmlformats.org/drawingml/2006/main" xmlns:r="http://schemas.openxmlformats.org/officeDocument/2006/relationships" xmlns:p1510="http://schemas.microsoft.com/office/powerpoint/2015/10/main">
   <p1510:revLst>
-    <p1510:client id="{130230E8-136B-4C2A-B2D5-A8CC6BC5E9E9}" v="1" dt="2023-11-21T12:50:52.008"/>
+    <p1510:client id="{130230E8-136B-4C2A-B2D5-A8CC6BC5E9E9}" v="32" dt="2023-11-21T19:34:55.187"/>
   </p1510:revLst>
 </p1510:revInfo>
 </file>
@@ -572,8 +577,8 @@
   </pc:docChgLst>
   <pc:docChgLst>
     <pc:chgData name="Ashutosh Dhaka" userId="2f4c5b15-b49f-49b2-acef-e0c6d1e9bfa6" providerId="ADAL" clId="{130230E8-136B-4C2A-B2D5-A8CC6BC5E9E9}"/>
-    <pc:docChg chg="custSel addSld modSld">
-      <pc:chgData name="Ashutosh Dhaka" userId="2f4c5b15-b49f-49b2-acef-e0c6d1e9bfa6" providerId="ADAL" clId="{130230E8-136B-4C2A-B2D5-A8CC6BC5E9E9}" dt="2023-11-21T14:28:41.357" v="778" actId="1076"/>
+    <pc:docChg chg="undo custSel addSld delSld modSld sldOrd">
+      <pc:chgData name="Ashutosh Dhaka" userId="2f4c5b15-b49f-49b2-acef-e0c6d1e9bfa6" providerId="ADAL" clId="{130230E8-136B-4C2A-B2D5-A8CC6BC5E9E9}" dt="2023-11-21T19:36:45.385" v="1502" actId="2711"/>
       <pc:docMkLst>
         <pc:docMk/>
       </pc:docMkLst>
@@ -632,8 +637,8 @@
           </ac:spMkLst>
         </pc:spChg>
       </pc:sldChg>
-      <pc:sldChg chg="addSp delSp modSp mod">
-        <pc:chgData name="Ashutosh Dhaka" userId="2f4c5b15-b49f-49b2-acef-e0c6d1e9bfa6" providerId="ADAL" clId="{130230E8-136B-4C2A-B2D5-A8CC6BC5E9E9}" dt="2023-11-21T12:56:22.590" v="64" actId="14100"/>
+      <pc:sldChg chg="addSp delSp modSp del mod">
+        <pc:chgData name="Ashutosh Dhaka" userId="2f4c5b15-b49f-49b2-acef-e0c6d1e9bfa6" providerId="ADAL" clId="{130230E8-136B-4C2A-B2D5-A8CC6BC5E9E9}" dt="2023-11-21T19:24:03.997" v="1194" actId="2696"/>
         <pc:sldMkLst>
           <pc:docMk/>
           <pc:sldMk cId="3181290772" sldId="291"/>
@@ -899,8 +904,8 @@
           </ac:spMkLst>
         </pc:spChg>
       </pc:sldChg>
-      <pc:sldChg chg="modSp new mod">
-        <pc:chgData name="Ashutosh Dhaka" userId="2f4c5b15-b49f-49b2-acef-e0c6d1e9bfa6" providerId="ADAL" clId="{130230E8-136B-4C2A-B2D5-A8CC6BC5E9E9}" dt="2023-11-21T14:28:41.357" v="778" actId="1076"/>
+      <pc:sldChg chg="modSp new del mod">
+        <pc:chgData name="Ashutosh Dhaka" userId="2f4c5b15-b49f-49b2-acef-e0c6d1e9bfa6" providerId="ADAL" clId="{130230E8-136B-4C2A-B2D5-A8CC6BC5E9E9}" dt="2023-11-21T19:35:51.465" v="1455" actId="2696"/>
         <pc:sldMkLst>
           <pc:docMk/>
           <pc:sldMk cId="2454163085" sldId="310"/>
@@ -919,6 +924,335 @@
             <pc:docMk/>
             <pc:sldMk cId="2454163085" sldId="310"/>
             <ac:spMk id="3" creationId="{3ADDCE65-D689-9D20-3A94-C1085BD28A55}"/>
+          </ac:spMkLst>
+        </pc:spChg>
+      </pc:sldChg>
+      <pc:sldChg chg="add">
+        <pc:chgData name="Ashutosh Dhaka" userId="2f4c5b15-b49f-49b2-acef-e0c6d1e9bfa6" providerId="ADAL" clId="{130230E8-136B-4C2A-B2D5-A8CC6BC5E9E9}" dt="2023-11-21T19:24:26.854" v="1198"/>
+        <pc:sldMkLst>
+          <pc:docMk/>
+          <pc:sldMk cId="368946314" sldId="311"/>
+        </pc:sldMkLst>
+      </pc:sldChg>
+      <pc:sldChg chg="addSp delSp modSp new del mod ord">
+        <pc:chgData name="Ashutosh Dhaka" userId="2f4c5b15-b49f-49b2-acef-e0c6d1e9bfa6" providerId="ADAL" clId="{130230E8-136B-4C2A-B2D5-A8CC6BC5E9E9}" dt="2023-11-21T19:24:21.855" v="1197" actId="2696"/>
+        <pc:sldMkLst>
+          <pc:docMk/>
+          <pc:sldMk cId="3425145145" sldId="311"/>
+        </pc:sldMkLst>
+        <pc:spChg chg="del">
+          <ac:chgData name="Ashutosh Dhaka" userId="2f4c5b15-b49f-49b2-acef-e0c6d1e9bfa6" providerId="ADAL" clId="{130230E8-136B-4C2A-B2D5-A8CC6BC5E9E9}" dt="2023-11-21T18:58:11.165" v="781" actId="478"/>
+          <ac:spMkLst>
+            <pc:docMk/>
+            <pc:sldMk cId="3425145145" sldId="311"/>
+            <ac:spMk id="2" creationId="{C180C51B-F965-99F9-5DC2-D8B4C060F233}"/>
+          </ac:spMkLst>
+        </pc:spChg>
+        <pc:spChg chg="del">
+          <ac:chgData name="Ashutosh Dhaka" userId="2f4c5b15-b49f-49b2-acef-e0c6d1e9bfa6" providerId="ADAL" clId="{130230E8-136B-4C2A-B2D5-A8CC6BC5E9E9}" dt="2023-11-21T18:58:08.476" v="780" actId="22"/>
+          <ac:spMkLst>
+            <pc:docMk/>
+            <pc:sldMk cId="3425145145" sldId="311"/>
+            <ac:spMk id="3" creationId="{55F76DB1-A442-EDDF-F381-A9C241ACCD73}"/>
+          </ac:spMkLst>
+        </pc:spChg>
+        <pc:spChg chg="add mod">
+          <ac:chgData name="Ashutosh Dhaka" userId="2f4c5b15-b49f-49b2-acef-e0c6d1e9bfa6" providerId="ADAL" clId="{130230E8-136B-4C2A-B2D5-A8CC6BC5E9E9}" dt="2023-11-21T19:15:10.226" v="881" actId="1076"/>
+          <ac:spMkLst>
+            <pc:docMk/>
+            <pc:sldMk cId="3425145145" sldId="311"/>
+            <ac:spMk id="14" creationId="{9CEC0CB5-418C-B210-CAA4-212F2570DC88}"/>
+          </ac:spMkLst>
+        </pc:spChg>
+        <pc:spChg chg="add mod">
+          <ac:chgData name="Ashutosh Dhaka" userId="2f4c5b15-b49f-49b2-acef-e0c6d1e9bfa6" providerId="ADAL" clId="{130230E8-136B-4C2A-B2D5-A8CC6BC5E9E9}" dt="2023-11-21T19:16:56.929" v="1016" actId="2711"/>
+          <ac:spMkLst>
+            <pc:docMk/>
+            <pc:sldMk cId="3425145145" sldId="311"/>
+            <ac:spMk id="15" creationId="{A1FC40A9-A3C9-B1A7-01A2-979907759406}"/>
+          </ac:spMkLst>
+        </pc:spChg>
+        <pc:spChg chg="add mod">
+          <ac:chgData name="Ashutosh Dhaka" userId="2f4c5b15-b49f-49b2-acef-e0c6d1e9bfa6" providerId="ADAL" clId="{130230E8-136B-4C2A-B2D5-A8CC6BC5E9E9}" dt="2023-11-21T19:17:00.885" v="1017" actId="2711"/>
+          <ac:spMkLst>
+            <pc:docMk/>
+            <pc:sldMk cId="3425145145" sldId="311"/>
+            <ac:spMk id="16" creationId="{BFC4C174-4249-E9B8-52C0-5A7F3ECC5ACE}"/>
+          </ac:spMkLst>
+        </pc:spChg>
+        <pc:spChg chg="add mod">
+          <ac:chgData name="Ashutosh Dhaka" userId="2f4c5b15-b49f-49b2-acef-e0c6d1e9bfa6" providerId="ADAL" clId="{130230E8-136B-4C2A-B2D5-A8CC6BC5E9E9}" dt="2023-11-21T19:16:52.066" v="1015" actId="2711"/>
+          <ac:spMkLst>
+            <pc:docMk/>
+            <pc:sldMk cId="3425145145" sldId="311"/>
+            <ac:spMk id="17" creationId="{C987EF91-53EF-5C9F-E41D-1B6EF3776349}"/>
+          </ac:spMkLst>
+        </pc:spChg>
+        <pc:picChg chg="add mod ord">
+          <ac:chgData name="Ashutosh Dhaka" userId="2f4c5b15-b49f-49b2-acef-e0c6d1e9bfa6" providerId="ADAL" clId="{130230E8-136B-4C2A-B2D5-A8CC6BC5E9E9}" dt="2023-11-21T19:16:42.578" v="1013" actId="1076"/>
+          <ac:picMkLst>
+            <pc:docMk/>
+            <pc:sldMk cId="3425145145" sldId="311"/>
+            <ac:picMk id="5" creationId="{9F254C6F-58BD-89D7-E71C-E5B3A5D99E4D}"/>
+          </ac:picMkLst>
+        </pc:picChg>
+        <pc:picChg chg="add mod">
+          <ac:chgData name="Ashutosh Dhaka" userId="2f4c5b15-b49f-49b2-acef-e0c6d1e9bfa6" providerId="ADAL" clId="{130230E8-136B-4C2A-B2D5-A8CC6BC5E9E9}" dt="2023-11-21T19:05:55.114" v="786" actId="14100"/>
+          <ac:picMkLst>
+            <pc:docMk/>
+            <pc:sldMk cId="3425145145" sldId="311"/>
+            <ac:picMk id="7" creationId="{3DC542F6-BD61-C7C9-F79B-214879F7EB40}"/>
+          </ac:picMkLst>
+        </pc:picChg>
+        <pc:picChg chg="add mod modCrop">
+          <ac:chgData name="Ashutosh Dhaka" userId="2f4c5b15-b49f-49b2-acef-e0c6d1e9bfa6" providerId="ADAL" clId="{130230E8-136B-4C2A-B2D5-A8CC6BC5E9E9}" dt="2023-11-21T19:06:58.057" v="795" actId="1076"/>
+          <ac:picMkLst>
+            <pc:docMk/>
+            <pc:sldMk cId="3425145145" sldId="311"/>
+            <ac:picMk id="9" creationId="{331399FA-B8AD-FF38-3FC6-584CFE446558}"/>
+          </ac:picMkLst>
+        </pc:picChg>
+        <pc:picChg chg="add mod">
+          <ac:chgData name="Ashutosh Dhaka" userId="2f4c5b15-b49f-49b2-acef-e0c6d1e9bfa6" providerId="ADAL" clId="{130230E8-136B-4C2A-B2D5-A8CC6BC5E9E9}" dt="2023-11-21T19:15:02.946" v="880" actId="1076"/>
+          <ac:picMkLst>
+            <pc:docMk/>
+            <pc:sldMk cId="3425145145" sldId="311"/>
+            <ac:picMk id="11" creationId="{99F1568F-63AE-9A66-9EB4-63E72AA9E176}"/>
+          </ac:picMkLst>
+        </pc:picChg>
+        <pc:picChg chg="add del mod">
+          <ac:chgData name="Ashutosh Dhaka" userId="2f4c5b15-b49f-49b2-acef-e0c6d1e9bfa6" providerId="ADAL" clId="{130230E8-136B-4C2A-B2D5-A8CC6BC5E9E9}" dt="2023-11-21T19:11:36.787" v="811" actId="21"/>
+          <ac:picMkLst>
+            <pc:docMk/>
+            <pc:sldMk cId="3425145145" sldId="311"/>
+            <ac:picMk id="13" creationId="{28ED7899-19F3-B32D-99A0-D53FDEC3CFA5}"/>
+          </ac:picMkLst>
+        </pc:picChg>
+      </pc:sldChg>
+      <pc:sldChg chg="addSp delSp modSp new del mod ord">
+        <pc:chgData name="Ashutosh Dhaka" userId="2f4c5b15-b49f-49b2-acef-e0c6d1e9bfa6" providerId="ADAL" clId="{130230E8-136B-4C2A-B2D5-A8CC6BC5E9E9}" dt="2023-11-21T19:24:21.855" v="1197" actId="2696"/>
+        <pc:sldMkLst>
+          <pc:docMk/>
+          <pc:sldMk cId="896907256" sldId="312"/>
+        </pc:sldMkLst>
+        <pc:spChg chg="del">
+          <ac:chgData name="Ashutosh Dhaka" userId="2f4c5b15-b49f-49b2-acef-e0c6d1e9bfa6" providerId="ADAL" clId="{130230E8-136B-4C2A-B2D5-A8CC6BC5E9E9}" dt="2023-11-21T19:11:30.585" v="809" actId="478"/>
+          <ac:spMkLst>
+            <pc:docMk/>
+            <pc:sldMk cId="896907256" sldId="312"/>
+            <ac:spMk id="2" creationId="{453EDAF7-BDF6-90EE-37B3-4DB7D25C9D0C}"/>
+          </ac:spMkLst>
+        </pc:spChg>
+        <pc:spChg chg="del">
+          <ac:chgData name="Ashutosh Dhaka" userId="2f4c5b15-b49f-49b2-acef-e0c6d1e9bfa6" providerId="ADAL" clId="{130230E8-136B-4C2A-B2D5-A8CC6BC5E9E9}" dt="2023-11-21T19:11:28.707" v="808" actId="22"/>
+          <ac:spMkLst>
+            <pc:docMk/>
+            <pc:sldMk cId="896907256" sldId="312"/>
+            <ac:spMk id="3" creationId="{2A53457F-7D81-7A94-10E2-72D22E39BDEC}"/>
+          </ac:spMkLst>
+        </pc:spChg>
+        <pc:spChg chg="add mod">
+          <ac:chgData name="Ashutosh Dhaka" userId="2f4c5b15-b49f-49b2-acef-e0c6d1e9bfa6" providerId="ADAL" clId="{130230E8-136B-4C2A-B2D5-A8CC6BC5E9E9}" dt="2023-11-21T19:17:49.912" v="1083" actId="2711"/>
+          <ac:spMkLst>
+            <pc:docMk/>
+            <pc:sldMk cId="896907256" sldId="312"/>
+            <ac:spMk id="9" creationId="{AFFA02FE-61D8-CFB7-2BE0-D8985BE2EFC9}"/>
+          </ac:spMkLst>
+        </pc:spChg>
+        <pc:spChg chg="add mod">
+          <ac:chgData name="Ashutosh Dhaka" userId="2f4c5b15-b49f-49b2-acef-e0c6d1e9bfa6" providerId="ADAL" clId="{130230E8-136B-4C2A-B2D5-A8CC6BC5E9E9}" dt="2023-11-21T19:19:40.847" v="1156" actId="1076"/>
+          <ac:spMkLst>
+            <pc:docMk/>
+            <pc:sldMk cId="896907256" sldId="312"/>
+            <ac:spMk id="10" creationId="{ADD7AB82-1EA5-DA64-43A5-2F41B054DED2}"/>
+          </ac:spMkLst>
+        </pc:spChg>
+        <pc:spChg chg="add del mod">
+          <ac:chgData name="Ashutosh Dhaka" userId="2f4c5b15-b49f-49b2-acef-e0c6d1e9bfa6" providerId="ADAL" clId="{130230E8-136B-4C2A-B2D5-A8CC6BC5E9E9}" dt="2023-11-21T19:20:50.270" v="1168" actId="767"/>
+          <ac:spMkLst>
+            <pc:docMk/>
+            <pc:sldMk cId="896907256" sldId="312"/>
+            <ac:spMk id="11" creationId="{D873B0C1-DC1D-BDE8-D76D-B80051597A3E}"/>
+          </ac:spMkLst>
+        </pc:spChg>
+        <pc:spChg chg="add mod">
+          <ac:chgData name="Ashutosh Dhaka" userId="2f4c5b15-b49f-49b2-acef-e0c6d1e9bfa6" providerId="ADAL" clId="{130230E8-136B-4C2A-B2D5-A8CC6BC5E9E9}" dt="2023-11-21T19:21:09.049" v="1191" actId="1076"/>
+          <ac:spMkLst>
+            <pc:docMk/>
+            <pc:sldMk cId="896907256" sldId="312"/>
+            <ac:spMk id="12" creationId="{8DF2C679-315B-DD17-A4C3-8D21EFDD1DAC}"/>
+          </ac:spMkLst>
+        </pc:spChg>
+        <pc:picChg chg="add mod ord">
+          <ac:chgData name="Ashutosh Dhaka" userId="2f4c5b15-b49f-49b2-acef-e0c6d1e9bfa6" providerId="ADAL" clId="{130230E8-136B-4C2A-B2D5-A8CC6BC5E9E9}" dt="2023-11-21T19:11:34.274" v="810" actId="1076"/>
+          <ac:picMkLst>
+            <pc:docMk/>
+            <pc:sldMk cId="896907256" sldId="312"/>
+            <ac:picMk id="5" creationId="{5EFB2E3B-B947-540B-8B50-076CCB85C243}"/>
+          </ac:picMkLst>
+        </pc:picChg>
+        <pc:picChg chg="add mod">
+          <ac:chgData name="Ashutosh Dhaka" userId="2f4c5b15-b49f-49b2-acef-e0c6d1e9bfa6" providerId="ADAL" clId="{130230E8-136B-4C2A-B2D5-A8CC6BC5E9E9}" dt="2023-11-21T19:13:46.195" v="839" actId="1076"/>
+          <ac:picMkLst>
+            <pc:docMk/>
+            <pc:sldMk cId="896907256" sldId="312"/>
+            <ac:picMk id="6" creationId="{BA121C45-BF0C-08F8-95A3-D519A47CCCA8}"/>
+          </ac:picMkLst>
+        </pc:picChg>
+        <pc:picChg chg="add mod modCrop">
+          <ac:chgData name="Ashutosh Dhaka" userId="2f4c5b15-b49f-49b2-acef-e0c6d1e9bfa6" providerId="ADAL" clId="{130230E8-136B-4C2A-B2D5-A8CC6BC5E9E9}" dt="2023-11-21T19:13:54.206" v="840" actId="1076"/>
+          <ac:picMkLst>
+            <pc:docMk/>
+            <pc:sldMk cId="896907256" sldId="312"/>
+            <ac:picMk id="8" creationId="{D5CC0A84-98BC-DD89-89D0-93BE70055884}"/>
+          </ac:picMkLst>
+        </pc:picChg>
+      </pc:sldChg>
+      <pc:sldChg chg="add">
+        <pc:chgData name="Ashutosh Dhaka" userId="2f4c5b15-b49f-49b2-acef-e0c6d1e9bfa6" providerId="ADAL" clId="{130230E8-136B-4C2A-B2D5-A8CC6BC5E9E9}" dt="2023-11-21T19:24:26.854" v="1198"/>
+        <pc:sldMkLst>
+          <pc:docMk/>
+          <pc:sldMk cId="2984085972" sldId="312"/>
+        </pc:sldMkLst>
+      </pc:sldChg>
+      <pc:sldChg chg="addSp delSp modSp new mod">
+        <pc:chgData name="Ashutosh Dhaka" userId="2f4c5b15-b49f-49b2-acef-e0c6d1e9bfa6" providerId="ADAL" clId="{130230E8-136B-4C2A-B2D5-A8CC6BC5E9E9}" dt="2023-11-21T19:35:39.801" v="1454" actId="113"/>
+        <pc:sldMkLst>
+          <pc:docMk/>
+          <pc:sldMk cId="274276022" sldId="313"/>
+        </pc:sldMkLst>
+        <pc:spChg chg="del">
+          <ac:chgData name="Ashutosh Dhaka" userId="2f4c5b15-b49f-49b2-acef-e0c6d1e9bfa6" providerId="ADAL" clId="{130230E8-136B-4C2A-B2D5-A8CC6BC5E9E9}" dt="2023-11-21T19:24:43.067" v="1200" actId="478"/>
+          <ac:spMkLst>
+            <pc:docMk/>
+            <pc:sldMk cId="274276022" sldId="313"/>
+            <ac:spMk id="2" creationId="{E4CFD13A-86A8-9505-6032-011F82378EF9}"/>
+          </ac:spMkLst>
+        </pc:spChg>
+        <pc:spChg chg="del">
+          <ac:chgData name="Ashutosh Dhaka" userId="2f4c5b15-b49f-49b2-acef-e0c6d1e9bfa6" providerId="ADAL" clId="{130230E8-136B-4C2A-B2D5-A8CC6BC5E9E9}" dt="2023-11-21T19:24:45.254" v="1201" actId="478"/>
+          <ac:spMkLst>
+            <pc:docMk/>
+            <pc:sldMk cId="274276022" sldId="313"/>
+            <ac:spMk id="3" creationId="{2CCCEF26-5A25-23F4-0460-C1D1B0B7A268}"/>
+          </ac:spMkLst>
+        </pc:spChg>
+        <pc:spChg chg="add mod">
+          <ac:chgData name="Ashutosh Dhaka" userId="2f4c5b15-b49f-49b2-acef-e0c6d1e9bfa6" providerId="ADAL" clId="{130230E8-136B-4C2A-B2D5-A8CC6BC5E9E9}" dt="2023-11-21T19:34:45.509" v="1401" actId="2711"/>
+          <ac:spMkLst>
+            <pc:docMk/>
+            <pc:sldMk cId="274276022" sldId="313"/>
+            <ac:spMk id="6" creationId="{3401CA7C-D6A2-FE14-A1D6-DFCE66F982F1}"/>
+          </ac:spMkLst>
+        </pc:spChg>
+        <pc:spChg chg="add mod">
+          <ac:chgData name="Ashutosh Dhaka" userId="2f4c5b15-b49f-49b2-acef-e0c6d1e9bfa6" providerId="ADAL" clId="{130230E8-136B-4C2A-B2D5-A8CC6BC5E9E9}" dt="2023-11-21T19:34:14.654" v="1397" actId="1076"/>
+          <ac:spMkLst>
+            <pc:docMk/>
+            <pc:sldMk cId="274276022" sldId="313"/>
+            <ac:spMk id="7" creationId="{0B68C9AA-15E0-2D6D-B5A9-4B61C895786A}"/>
+          </ac:spMkLst>
+        </pc:spChg>
+        <pc:spChg chg="add del">
+          <ac:chgData name="Ashutosh Dhaka" userId="2f4c5b15-b49f-49b2-acef-e0c6d1e9bfa6" providerId="ADAL" clId="{130230E8-136B-4C2A-B2D5-A8CC6BC5E9E9}" dt="2023-11-21T19:32:53.536" v="1274" actId="11529"/>
+          <ac:spMkLst>
+            <pc:docMk/>
+            <pc:sldMk cId="274276022" sldId="313"/>
+            <ac:spMk id="8" creationId="{DF0C96A7-C37D-A80C-BA1C-6BC8F46022EB}"/>
+          </ac:spMkLst>
+        </pc:spChg>
+        <pc:spChg chg="add mod">
+          <ac:chgData name="Ashutosh Dhaka" userId="2f4c5b15-b49f-49b2-acef-e0c6d1e9bfa6" providerId="ADAL" clId="{130230E8-136B-4C2A-B2D5-A8CC6BC5E9E9}" dt="2023-11-21T19:34:14.654" v="1397" actId="1076"/>
+          <ac:spMkLst>
+            <pc:docMk/>
+            <pc:sldMk cId="274276022" sldId="313"/>
+            <ac:spMk id="9" creationId="{CEB69812-DDF7-21FD-B801-9FD4BFCB18FC}"/>
+          </ac:spMkLst>
+        </pc:spChg>
+        <pc:spChg chg="add mod">
+          <ac:chgData name="Ashutosh Dhaka" userId="2f4c5b15-b49f-49b2-acef-e0c6d1e9bfa6" providerId="ADAL" clId="{130230E8-136B-4C2A-B2D5-A8CC6BC5E9E9}" dt="2023-11-21T19:34:41.413" v="1400" actId="2711"/>
+          <ac:spMkLst>
+            <pc:docMk/>
+            <pc:sldMk cId="274276022" sldId="313"/>
+            <ac:spMk id="10" creationId="{12C5288D-A280-6223-87E1-BBF6B13293A2}"/>
+          </ac:spMkLst>
+        </pc:spChg>
+        <pc:spChg chg="add mod">
+          <ac:chgData name="Ashutosh Dhaka" userId="2f4c5b15-b49f-49b2-acef-e0c6d1e9bfa6" providerId="ADAL" clId="{130230E8-136B-4C2A-B2D5-A8CC6BC5E9E9}" dt="2023-11-21T19:35:39.801" v="1454" actId="113"/>
+          <ac:spMkLst>
+            <pc:docMk/>
+            <pc:sldMk cId="274276022" sldId="313"/>
+            <ac:spMk id="11" creationId="{87C00CE2-9BED-7ED2-6CED-5B5A15A5A672}"/>
+          </ac:spMkLst>
+        </pc:spChg>
+        <pc:picChg chg="add mod">
+          <ac:chgData name="Ashutosh Dhaka" userId="2f4c5b15-b49f-49b2-acef-e0c6d1e9bfa6" providerId="ADAL" clId="{130230E8-136B-4C2A-B2D5-A8CC6BC5E9E9}" dt="2023-11-21T19:34:14.654" v="1397" actId="1076"/>
+          <ac:picMkLst>
+            <pc:docMk/>
+            <pc:sldMk cId="274276022" sldId="313"/>
+            <ac:picMk id="5" creationId="{DD1376CB-1416-08A9-FC89-02F9FFB19CB6}"/>
+          </ac:picMkLst>
+        </pc:picChg>
+        <pc:picChg chg="add mod">
+          <ac:chgData name="Ashutosh Dhaka" userId="2f4c5b15-b49f-49b2-acef-e0c6d1e9bfa6" providerId="ADAL" clId="{130230E8-136B-4C2A-B2D5-A8CC6BC5E9E9}" dt="2023-11-21T19:34:29.323" v="1399" actId="1076"/>
+          <ac:picMkLst>
+            <pc:docMk/>
+            <pc:sldMk cId="274276022" sldId="313"/>
+            <ac:picMk id="1026" creationId="{8BC0B48B-2A44-BEF3-3FE3-9AAC5FE40A22}"/>
+          </ac:picMkLst>
+        </pc:picChg>
+        <pc:picChg chg="add mod">
+          <ac:chgData name="Ashutosh Dhaka" userId="2f4c5b15-b49f-49b2-acef-e0c6d1e9bfa6" providerId="ADAL" clId="{130230E8-136B-4C2A-B2D5-A8CC6BC5E9E9}" dt="2023-11-21T19:34:26.522" v="1398" actId="1076"/>
+          <ac:picMkLst>
+            <pc:docMk/>
+            <pc:sldMk cId="274276022" sldId="313"/>
+            <ac:picMk id="1028" creationId="{6BA9B9CB-6ACB-91CE-E089-CF028AC37C44}"/>
+          </ac:picMkLst>
+        </pc:picChg>
+      </pc:sldChg>
+      <pc:sldChg chg="delSp modSp new mod">
+        <pc:chgData name="Ashutosh Dhaka" userId="2f4c5b15-b49f-49b2-acef-e0c6d1e9bfa6" providerId="ADAL" clId="{130230E8-136B-4C2A-B2D5-A8CC6BC5E9E9}" dt="2023-11-21T19:36:45.385" v="1502" actId="2711"/>
+        <pc:sldMkLst>
+          <pc:docMk/>
+          <pc:sldMk cId="321469141" sldId="314"/>
+        </pc:sldMkLst>
+        <pc:spChg chg="mod">
+          <ac:chgData name="Ashutosh Dhaka" userId="2f4c5b15-b49f-49b2-acef-e0c6d1e9bfa6" providerId="ADAL" clId="{130230E8-136B-4C2A-B2D5-A8CC6BC5E9E9}" dt="2023-11-21T19:36:45.385" v="1502" actId="2711"/>
+          <ac:spMkLst>
+            <pc:docMk/>
+            <pc:sldMk cId="321469141" sldId="314"/>
+            <ac:spMk id="2" creationId="{3A88E6A1-3150-378A-5271-EAEC024BE4F3}"/>
+          </ac:spMkLst>
+        </pc:spChg>
+        <pc:spChg chg="del">
+          <ac:chgData name="Ashutosh Dhaka" userId="2f4c5b15-b49f-49b2-acef-e0c6d1e9bfa6" providerId="ADAL" clId="{130230E8-136B-4C2A-B2D5-A8CC6BC5E9E9}" dt="2023-11-21T19:36:27.910" v="1498" actId="478"/>
+          <ac:spMkLst>
+            <pc:docMk/>
+            <pc:sldMk cId="321469141" sldId="314"/>
+            <ac:spMk id="3" creationId="{351B5D18-CA68-3E49-4A38-BCC0E9114069}"/>
+          </ac:spMkLst>
+        </pc:spChg>
+      </pc:sldChg>
+      <pc:sldChg chg="addSp delSp new del mod">
+        <pc:chgData name="Ashutosh Dhaka" userId="2f4c5b15-b49f-49b2-acef-e0c6d1e9bfa6" providerId="ADAL" clId="{130230E8-136B-4C2A-B2D5-A8CC6BC5E9E9}" dt="2023-11-21T19:36:07.505" v="1461" actId="2696"/>
+        <pc:sldMkLst>
+          <pc:docMk/>
+          <pc:sldMk cId="2158330899" sldId="314"/>
+        </pc:sldMkLst>
+        <pc:spChg chg="add del">
+          <ac:chgData name="Ashutosh Dhaka" userId="2f4c5b15-b49f-49b2-acef-e0c6d1e9bfa6" providerId="ADAL" clId="{130230E8-136B-4C2A-B2D5-A8CC6BC5E9E9}" dt="2023-11-21T19:36:05.943" v="1460" actId="478"/>
+          <ac:spMkLst>
+            <pc:docMk/>
+            <pc:sldMk cId="2158330899" sldId="314"/>
+            <ac:spMk id="2" creationId="{20B458B0-ED7A-6C3E-CF4E-B767DF12FE53}"/>
+          </ac:spMkLst>
+        </pc:spChg>
+        <pc:spChg chg="add del">
+          <ac:chgData name="Ashutosh Dhaka" userId="2f4c5b15-b49f-49b2-acef-e0c6d1e9bfa6" providerId="ADAL" clId="{130230E8-136B-4C2A-B2D5-A8CC6BC5E9E9}" dt="2023-11-21T19:36:05.328" v="1459" actId="478"/>
+          <ac:spMkLst>
+            <pc:docMk/>
+            <pc:sldMk cId="2158330899" sldId="314"/>
+            <ac:spMk id="3" creationId="{7A02365F-1421-1D3A-5764-78184AA331D8}"/>
           </ac:spMkLst>
         </pc:spChg>
       </pc:sldChg>
@@ -3585,6 +3919,356 @@
 </dgm:styleDef>
 </file>
 
+<file path=ppt/notesMasters/notesMaster1.xml><?xml version="1.0" encoding="utf-8"?>
+<p:notesMaster xmlns:a="http://schemas.openxmlformats.org/drawingml/2006/main" xmlns:r="http://schemas.openxmlformats.org/officeDocument/2006/relationships" xmlns:p="http://schemas.openxmlformats.org/presentationml/2006/main">
+  <p:cSld>
+    <p:bg>
+      <p:bgRef idx="1001">
+        <a:schemeClr val="bg1"/>
+      </p:bgRef>
+    </p:bg>
+    <p:spTree>
+      <p:nvGrpSpPr>
+        <p:cNvPr id="1" name=""/>
+        <p:cNvGrpSpPr/>
+        <p:nvPr/>
+      </p:nvGrpSpPr>
+      <p:grpSpPr>
+        <a:xfrm>
+          <a:off x="0" y="0"/>
+          <a:ext cx="0" cy="0"/>
+          <a:chOff x="0" y="0"/>
+          <a:chExt cx="0" cy="0"/>
+        </a:xfrm>
+      </p:grpSpPr>
+      <p:sp>
+        <p:nvSpPr>
+          <p:cNvPr id="2" name="Header Placeholder 1"/>
+          <p:cNvSpPr>
+            <a:spLocks noGrp="1"/>
+          </p:cNvSpPr>
+          <p:nvPr>
+            <p:ph type="hdr" sz="quarter"/>
+          </p:nvPr>
+        </p:nvSpPr>
+        <p:spPr>
+          <a:xfrm>
+            <a:off x="0" y="0"/>
+            <a:ext cx="2971800" cy="458788"/>
+          </a:xfrm>
+          <a:prstGeom prst="rect">
+            <a:avLst/>
+          </a:prstGeom>
+        </p:spPr>
+        <p:txBody>
+          <a:bodyPr vert="horz" lIns="91440" tIns="45720" rIns="91440" bIns="45720" rtlCol="0"/>
+          <a:lstStyle>
+            <a:lvl1pPr algn="l">
+              <a:defRPr sz="1200"/>
+            </a:lvl1pPr>
+          </a:lstStyle>
+          <a:p>
+            <a:endParaRPr lang="en-GB"/>
+          </a:p>
+        </p:txBody>
+      </p:sp>
+      <p:sp>
+        <p:nvSpPr>
+          <p:cNvPr id="3" name="Date Placeholder 2"/>
+          <p:cNvSpPr>
+            <a:spLocks noGrp="1"/>
+          </p:cNvSpPr>
+          <p:nvPr>
+            <p:ph type="dt" idx="1"/>
+          </p:nvPr>
+        </p:nvSpPr>
+        <p:spPr>
+          <a:xfrm>
+            <a:off x="3884613" y="0"/>
+            <a:ext cx="2971800" cy="458788"/>
+          </a:xfrm>
+          <a:prstGeom prst="rect">
+            <a:avLst/>
+          </a:prstGeom>
+        </p:spPr>
+        <p:txBody>
+          <a:bodyPr vert="horz" lIns="91440" tIns="45720" rIns="91440" bIns="45720" rtlCol="0"/>
+          <a:lstStyle>
+            <a:lvl1pPr algn="r">
+              <a:defRPr sz="1200"/>
+            </a:lvl1pPr>
+          </a:lstStyle>
+          <a:p>
+            <a:fld id="{51D7667D-475E-472F-AD7E-46D13729DE9D}" type="datetimeFigureOut">
+              <a:rPr lang="en-GB" smtClean="0"/>
+              <a:t>21/11/2023</a:t>
+            </a:fld>
+            <a:endParaRPr lang="en-GB"/>
+          </a:p>
+        </p:txBody>
+      </p:sp>
+      <p:sp>
+        <p:nvSpPr>
+          <p:cNvPr id="4" name="Slide Image Placeholder 3"/>
+          <p:cNvSpPr>
+            <a:spLocks noGrp="1" noRot="1" noChangeAspect="1"/>
+          </p:cNvSpPr>
+          <p:nvPr>
+            <p:ph type="sldImg" idx="2"/>
+          </p:nvPr>
+        </p:nvSpPr>
+        <p:spPr>
+          <a:xfrm>
+            <a:off x="685800" y="1143000"/>
+            <a:ext cx="5486400" cy="3086100"/>
+          </a:xfrm>
+          <a:prstGeom prst="rect">
+            <a:avLst/>
+          </a:prstGeom>
+          <a:noFill/>
+          <a:ln w="12700">
+            <a:solidFill>
+              <a:prstClr val="black"/>
+            </a:solidFill>
+          </a:ln>
+        </p:spPr>
+        <p:txBody>
+          <a:bodyPr vert="horz" lIns="91440" tIns="45720" rIns="91440" bIns="45720" rtlCol="0" anchor="ctr"/>
+          <a:lstStyle/>
+          <a:p>
+            <a:endParaRPr lang="en-GB"/>
+          </a:p>
+        </p:txBody>
+      </p:sp>
+      <p:sp>
+        <p:nvSpPr>
+          <p:cNvPr id="5" name="Notes Placeholder 4"/>
+          <p:cNvSpPr>
+            <a:spLocks noGrp="1"/>
+          </p:cNvSpPr>
+          <p:nvPr>
+            <p:ph type="body" sz="quarter" idx="3"/>
+          </p:nvPr>
+        </p:nvSpPr>
+        <p:spPr>
+          <a:xfrm>
+            <a:off x="685800" y="4400550"/>
+            <a:ext cx="5486400" cy="3600450"/>
+          </a:xfrm>
+          <a:prstGeom prst="rect">
+            <a:avLst/>
+          </a:prstGeom>
+        </p:spPr>
+        <p:txBody>
+          <a:bodyPr vert="horz" lIns="91440" tIns="45720" rIns="91440" bIns="45720" rtlCol="0"/>
+          <a:lstStyle/>
+          <a:p>
+            <a:pPr lvl="0"/>
+            <a:r>
+              <a:rPr lang="en-US"/>
+              <a:t>Click to edit Master text styles</a:t>
+            </a:r>
+          </a:p>
+          <a:p>
+            <a:pPr lvl="1"/>
+            <a:r>
+              <a:rPr lang="en-US"/>
+              <a:t>Second level</a:t>
+            </a:r>
+          </a:p>
+          <a:p>
+            <a:pPr lvl="2"/>
+            <a:r>
+              <a:rPr lang="en-US"/>
+              <a:t>Third level</a:t>
+            </a:r>
+          </a:p>
+          <a:p>
+            <a:pPr lvl="3"/>
+            <a:r>
+              <a:rPr lang="en-US"/>
+              <a:t>Fourth level</a:t>
+            </a:r>
+          </a:p>
+          <a:p>
+            <a:pPr lvl="4"/>
+            <a:r>
+              <a:rPr lang="en-US"/>
+              <a:t>Fifth level</a:t>
+            </a:r>
+            <a:endParaRPr lang="en-GB"/>
+          </a:p>
+        </p:txBody>
+      </p:sp>
+      <p:sp>
+        <p:nvSpPr>
+          <p:cNvPr id="6" name="Footer Placeholder 5"/>
+          <p:cNvSpPr>
+            <a:spLocks noGrp="1"/>
+          </p:cNvSpPr>
+          <p:nvPr>
+            <p:ph type="ftr" sz="quarter" idx="4"/>
+          </p:nvPr>
+        </p:nvSpPr>
+        <p:spPr>
+          <a:xfrm>
+            <a:off x="0" y="8685213"/>
+            <a:ext cx="2971800" cy="458787"/>
+          </a:xfrm>
+          <a:prstGeom prst="rect">
+            <a:avLst/>
+          </a:prstGeom>
+        </p:spPr>
+        <p:txBody>
+          <a:bodyPr vert="horz" lIns="91440" tIns="45720" rIns="91440" bIns="45720" rtlCol="0" anchor="b"/>
+          <a:lstStyle>
+            <a:lvl1pPr algn="l">
+              <a:defRPr sz="1200"/>
+            </a:lvl1pPr>
+          </a:lstStyle>
+          <a:p>
+            <a:endParaRPr lang="en-GB"/>
+          </a:p>
+        </p:txBody>
+      </p:sp>
+      <p:sp>
+        <p:nvSpPr>
+          <p:cNvPr id="7" name="Slide Number Placeholder 6"/>
+          <p:cNvSpPr>
+            <a:spLocks noGrp="1"/>
+          </p:cNvSpPr>
+          <p:nvPr>
+            <p:ph type="sldNum" sz="quarter" idx="5"/>
+          </p:nvPr>
+        </p:nvSpPr>
+        <p:spPr>
+          <a:xfrm>
+            <a:off x="3884613" y="8685213"/>
+            <a:ext cx="2971800" cy="458787"/>
+          </a:xfrm>
+          <a:prstGeom prst="rect">
+            <a:avLst/>
+          </a:prstGeom>
+        </p:spPr>
+        <p:txBody>
+          <a:bodyPr vert="horz" lIns="91440" tIns="45720" rIns="91440" bIns="45720" rtlCol="0" anchor="b"/>
+          <a:lstStyle>
+            <a:lvl1pPr algn="r">
+              <a:defRPr sz="1200"/>
+            </a:lvl1pPr>
+          </a:lstStyle>
+          <a:p>
+            <a:fld id="{47869B47-45CE-4097-B733-AD6F43744A38}" type="slidenum">
+              <a:rPr lang="en-GB" smtClean="0"/>
+              <a:t>‹#›</a:t>
+            </a:fld>
+            <a:endParaRPr lang="en-GB"/>
+          </a:p>
+        </p:txBody>
+      </p:sp>
+    </p:spTree>
+    <p:extLst>
+      <p:ext uri="{BB962C8B-B14F-4D97-AF65-F5344CB8AC3E}">
+        <p14:creationId xmlns:p14="http://schemas.microsoft.com/office/powerpoint/2010/main" val="4164844864"/>
+      </p:ext>
+    </p:extLst>
+  </p:cSld>
+  <p:clrMap bg1="lt1" tx1="dk1" bg2="lt2" tx2="dk2" accent1="accent1" accent2="accent2" accent3="accent3" accent4="accent4" accent5="accent5" accent6="accent6" hlink="hlink" folHlink="folHlink"/>
+  <p:notesStyle>
+    <a:lvl1pPr marL="0" algn="l" defTabSz="914400" rtl="0" eaLnBrk="1" latinLnBrk="0" hangingPunct="1">
+      <a:defRPr sz="1200" kern="1200">
+        <a:solidFill>
+          <a:schemeClr val="tx1"/>
+        </a:solidFill>
+        <a:latin typeface="+mn-lt"/>
+        <a:ea typeface="+mn-ea"/>
+        <a:cs typeface="+mn-cs"/>
+      </a:defRPr>
+    </a:lvl1pPr>
+    <a:lvl2pPr marL="457200" algn="l" defTabSz="914400" rtl="0" eaLnBrk="1" latinLnBrk="0" hangingPunct="1">
+      <a:defRPr sz="1200" kern="1200">
+        <a:solidFill>
+          <a:schemeClr val="tx1"/>
+        </a:solidFill>
+        <a:latin typeface="+mn-lt"/>
+        <a:ea typeface="+mn-ea"/>
+        <a:cs typeface="+mn-cs"/>
+      </a:defRPr>
+    </a:lvl2pPr>
+    <a:lvl3pPr marL="914400" algn="l" defTabSz="914400" rtl="0" eaLnBrk="1" latinLnBrk="0" hangingPunct="1">
+      <a:defRPr sz="1200" kern="1200">
+        <a:solidFill>
+          <a:schemeClr val="tx1"/>
+        </a:solidFill>
+        <a:latin typeface="+mn-lt"/>
+        <a:ea typeface="+mn-ea"/>
+        <a:cs typeface="+mn-cs"/>
+      </a:defRPr>
+    </a:lvl3pPr>
+    <a:lvl4pPr marL="1371600" algn="l" defTabSz="914400" rtl="0" eaLnBrk="1" latinLnBrk="0" hangingPunct="1">
+      <a:defRPr sz="1200" kern="1200">
+        <a:solidFill>
+          <a:schemeClr val="tx1"/>
+        </a:solidFill>
+        <a:latin typeface="+mn-lt"/>
+        <a:ea typeface="+mn-ea"/>
+        <a:cs typeface="+mn-cs"/>
+      </a:defRPr>
+    </a:lvl4pPr>
+    <a:lvl5pPr marL="1828800" algn="l" defTabSz="914400" rtl="0" eaLnBrk="1" latinLnBrk="0" hangingPunct="1">
+      <a:defRPr sz="1200" kern="1200">
+        <a:solidFill>
+          <a:schemeClr val="tx1"/>
+        </a:solidFill>
+        <a:latin typeface="+mn-lt"/>
+        <a:ea typeface="+mn-ea"/>
+        <a:cs typeface="+mn-cs"/>
+      </a:defRPr>
+    </a:lvl5pPr>
+    <a:lvl6pPr marL="2286000" algn="l" defTabSz="914400" rtl="0" eaLnBrk="1" latinLnBrk="0" hangingPunct="1">
+      <a:defRPr sz="1200" kern="1200">
+        <a:solidFill>
+          <a:schemeClr val="tx1"/>
+        </a:solidFill>
+        <a:latin typeface="+mn-lt"/>
+        <a:ea typeface="+mn-ea"/>
+        <a:cs typeface="+mn-cs"/>
+      </a:defRPr>
+    </a:lvl6pPr>
+    <a:lvl7pPr marL="2743200" algn="l" defTabSz="914400" rtl="0" eaLnBrk="1" latinLnBrk="0" hangingPunct="1">
+      <a:defRPr sz="1200" kern="1200">
+        <a:solidFill>
+          <a:schemeClr val="tx1"/>
+        </a:solidFill>
+        <a:latin typeface="+mn-lt"/>
+        <a:ea typeface="+mn-ea"/>
+        <a:cs typeface="+mn-cs"/>
+      </a:defRPr>
+    </a:lvl7pPr>
+    <a:lvl8pPr marL="3200400" algn="l" defTabSz="914400" rtl="0" eaLnBrk="1" latinLnBrk="0" hangingPunct="1">
+      <a:defRPr sz="1200" kern="1200">
+        <a:solidFill>
+          <a:schemeClr val="tx1"/>
+        </a:solidFill>
+        <a:latin typeface="+mn-lt"/>
+        <a:ea typeface="+mn-ea"/>
+        <a:cs typeface="+mn-cs"/>
+      </a:defRPr>
+    </a:lvl8pPr>
+    <a:lvl9pPr marL="3657600" algn="l" defTabSz="914400" rtl="0" eaLnBrk="1" latinLnBrk="0" hangingPunct="1">
+      <a:defRPr sz="1200" kern="1200">
+        <a:solidFill>
+          <a:schemeClr val="tx1"/>
+        </a:solidFill>
+        <a:latin typeface="+mn-lt"/>
+        <a:ea typeface="+mn-ea"/>
+        <a:cs typeface="+mn-cs"/>
+      </a:defRPr>
+    </a:lvl9pPr>
+  </p:notesStyle>
+</p:notesMaster>
+</file>
+
 <file path=ppt/slideLayouts/slideLayout1.xml><?xml version="1.0" encoding="utf-8"?>
 <p:sldLayout xmlns:a="http://schemas.openxmlformats.org/drawingml/2006/main" xmlns:r="http://schemas.openxmlformats.org/officeDocument/2006/relationships" xmlns:p="http://schemas.openxmlformats.org/presentationml/2006/main" type="title" preserve="1">
   <p:cSld name="Title Slide">
@@ -8583,6 +9267,536 @@
           <a:chExt cx="0" cy="0"/>
         </a:xfrm>
       </p:grpSpPr>
+      <p:pic>
+        <p:nvPicPr>
+          <p:cNvPr id="5" name="Content Placeholder 4">
+            <a:extLst>
+              <a:ext uri="{FF2B5EF4-FFF2-40B4-BE49-F238E27FC236}">
+                <a16:creationId xmlns:a16="http://schemas.microsoft.com/office/drawing/2014/main" id="{9F254C6F-58BD-89D7-E71C-E5B3A5D99E4D}"/>
+              </a:ext>
+            </a:extLst>
+          </p:cNvPr>
+          <p:cNvPicPr>
+            <a:picLocks noGrp="1" noChangeAspect="1"/>
+          </p:cNvPicPr>
+          <p:nvPr>
+            <p:ph idx="1"/>
+          </p:nvPr>
+        </p:nvPicPr>
+        <p:blipFill>
+          <a:blip r:embed="rId2"/>
+          <a:stretch>
+            <a:fillRect/>
+          </a:stretch>
+        </p:blipFill>
+        <p:spPr>
+          <a:xfrm>
+            <a:off x="838200" y="380702"/>
+            <a:ext cx="10515600" cy="1963789"/>
+          </a:xfrm>
+        </p:spPr>
+      </p:pic>
+      <p:pic>
+        <p:nvPicPr>
+          <p:cNvPr id="7" name="Picture 6">
+            <a:extLst>
+              <a:ext uri="{FF2B5EF4-FFF2-40B4-BE49-F238E27FC236}">
+                <a16:creationId xmlns:a16="http://schemas.microsoft.com/office/drawing/2014/main" id="{3DC542F6-BD61-C7C9-F79B-214879F7EB40}"/>
+              </a:ext>
+            </a:extLst>
+          </p:cNvPr>
+          <p:cNvPicPr>
+            <a:picLocks noChangeAspect="1"/>
+          </p:cNvPicPr>
+          <p:nvPr/>
+        </p:nvPicPr>
+        <p:blipFill>
+          <a:blip r:embed="rId3"/>
+          <a:stretch>
+            <a:fillRect/>
+          </a:stretch>
+        </p:blipFill>
+        <p:spPr>
+          <a:xfrm>
+            <a:off x="838200" y="2181274"/>
+            <a:ext cx="4646467" cy="1963790"/>
+          </a:xfrm>
+          <a:prstGeom prst="rect">
+            <a:avLst/>
+          </a:prstGeom>
+        </p:spPr>
+      </p:pic>
+      <p:pic>
+        <p:nvPicPr>
+          <p:cNvPr id="9" name="Picture 8">
+            <a:extLst>
+              <a:ext uri="{FF2B5EF4-FFF2-40B4-BE49-F238E27FC236}">
+                <a16:creationId xmlns:a16="http://schemas.microsoft.com/office/drawing/2014/main" id="{331399FA-B8AD-FF38-3FC6-584CFE446558}"/>
+              </a:ext>
+            </a:extLst>
+          </p:cNvPr>
+          <p:cNvPicPr>
+            <a:picLocks noChangeAspect="1"/>
+          </p:cNvPicPr>
+          <p:nvPr/>
+        </p:nvPicPr>
+        <p:blipFill rotWithShape="1">
+          <a:blip r:embed="rId4"/>
+          <a:srcRect t="12388" b="14883"/>
+          <a:stretch/>
+        </p:blipFill>
+        <p:spPr>
+          <a:xfrm>
+            <a:off x="5762661" y="2262882"/>
+            <a:ext cx="5591139" cy="1800573"/>
+          </a:xfrm>
+          <a:prstGeom prst="rect">
+            <a:avLst/>
+          </a:prstGeom>
+        </p:spPr>
+      </p:pic>
+      <p:pic>
+        <p:nvPicPr>
+          <p:cNvPr id="11" name="Picture 10">
+            <a:extLst>
+              <a:ext uri="{FF2B5EF4-FFF2-40B4-BE49-F238E27FC236}">
+                <a16:creationId xmlns:a16="http://schemas.microsoft.com/office/drawing/2014/main" id="{99F1568F-63AE-9A66-9EB4-63E72AA9E176}"/>
+              </a:ext>
+            </a:extLst>
+          </p:cNvPr>
+          <p:cNvPicPr>
+            <a:picLocks noChangeAspect="1"/>
+          </p:cNvPicPr>
+          <p:nvPr/>
+        </p:nvPicPr>
+        <p:blipFill>
+          <a:blip r:embed="rId5"/>
+          <a:stretch>
+            <a:fillRect/>
+          </a:stretch>
+        </p:blipFill>
+        <p:spPr>
+          <a:xfrm>
+            <a:off x="4705657" y="4145063"/>
+            <a:ext cx="2114006" cy="2218080"/>
+          </a:xfrm>
+          <a:prstGeom prst="rect">
+            <a:avLst/>
+          </a:prstGeom>
+        </p:spPr>
+      </p:pic>
+      <p:sp>
+        <p:nvSpPr>
+          <p:cNvPr id="14" name="TextBox 13">
+            <a:extLst>
+              <a:ext uri="{FF2B5EF4-FFF2-40B4-BE49-F238E27FC236}">
+                <a16:creationId xmlns:a16="http://schemas.microsoft.com/office/drawing/2014/main" id="{9CEC0CB5-418C-B210-CAA4-212F2570DC88}"/>
+              </a:ext>
+            </a:extLst>
+          </p:cNvPr>
+          <p:cNvSpPr txBox="1"/>
+          <p:nvPr/>
+        </p:nvSpPr>
+        <p:spPr>
+          <a:xfrm>
+            <a:off x="4438675" y="6260085"/>
+            <a:ext cx="2647969" cy="369332"/>
+          </a:xfrm>
+          <a:prstGeom prst="rect">
+            <a:avLst/>
+          </a:prstGeom>
+          <a:noFill/>
+        </p:spPr>
+        <p:txBody>
+          <a:bodyPr wrap="none" rtlCol="0">
+            <a:spAutoFit/>
+          </a:bodyPr>
+          <a:lstStyle/>
+          <a:p>
+            <a:pPr algn="ctr"/>
+            <a:r>
+              <a:rPr lang="en-GB" dirty="0">
+                <a:ea typeface="Adobe Fan Heiti Std B" panose="020B0700000000000000"/>
+              </a:rPr>
+              <a:t>Current Running topology</a:t>
+            </a:r>
+          </a:p>
+        </p:txBody>
+      </p:sp>
+      <p:sp>
+        <p:nvSpPr>
+          <p:cNvPr id="15" name="TextBox 14">
+            <a:extLst>
+              <a:ext uri="{FF2B5EF4-FFF2-40B4-BE49-F238E27FC236}">
+                <a16:creationId xmlns:a16="http://schemas.microsoft.com/office/drawing/2014/main" id="{A1FC40A9-A3C9-B1A7-01A2-979907759406}"/>
+              </a:ext>
+            </a:extLst>
+          </p:cNvPr>
+          <p:cNvSpPr txBox="1"/>
+          <p:nvPr/>
+        </p:nvSpPr>
+        <p:spPr>
+          <a:xfrm>
+            <a:off x="2014388" y="4145063"/>
+            <a:ext cx="2294090" cy="369332"/>
+          </a:xfrm>
+          <a:prstGeom prst="rect">
+            <a:avLst/>
+          </a:prstGeom>
+          <a:noFill/>
+        </p:spPr>
+        <p:txBody>
+          <a:bodyPr wrap="none" rtlCol="0">
+            <a:spAutoFit/>
+          </a:bodyPr>
+          <a:lstStyle/>
+          <a:p>
+            <a:r>
+              <a:rPr lang="en-GB" dirty="0">
+                <a:ea typeface="Adobe Fan Heiti Std B" panose="020B0700000000000000"/>
+              </a:rPr>
+              <a:t>Flask interface to login</a:t>
+            </a:r>
+          </a:p>
+        </p:txBody>
+      </p:sp>
+      <p:sp>
+        <p:nvSpPr>
+          <p:cNvPr id="16" name="TextBox 15">
+            <a:extLst>
+              <a:ext uri="{FF2B5EF4-FFF2-40B4-BE49-F238E27FC236}">
+                <a16:creationId xmlns:a16="http://schemas.microsoft.com/office/drawing/2014/main" id="{BFC4C174-4249-E9B8-52C0-5A7F3ECC5ACE}"/>
+              </a:ext>
+            </a:extLst>
+          </p:cNvPr>
+          <p:cNvSpPr txBox="1"/>
+          <p:nvPr/>
+        </p:nvSpPr>
+        <p:spPr>
+          <a:xfrm>
+            <a:off x="7590365" y="4145063"/>
+            <a:ext cx="2587247" cy="369332"/>
+          </a:xfrm>
+          <a:prstGeom prst="rect">
+            <a:avLst/>
+          </a:prstGeom>
+          <a:noFill/>
+        </p:spPr>
+        <p:txBody>
+          <a:bodyPr wrap="none" rtlCol="0">
+            <a:spAutoFit/>
+          </a:bodyPr>
+          <a:lstStyle/>
+          <a:p>
+            <a:r>
+              <a:rPr lang="en-GB" dirty="0">
+                <a:ea typeface="Adobe Fan Heiti Std B" panose="020B0700000000000000"/>
+              </a:rPr>
+              <a:t>Switch 1 flows after login</a:t>
+            </a:r>
+          </a:p>
+        </p:txBody>
+      </p:sp>
+      <p:sp>
+        <p:nvSpPr>
+          <p:cNvPr id="17" name="TextBox 16">
+            <a:extLst>
+              <a:ext uri="{FF2B5EF4-FFF2-40B4-BE49-F238E27FC236}">
+                <a16:creationId xmlns:a16="http://schemas.microsoft.com/office/drawing/2014/main" id="{C987EF91-53EF-5C9F-E41D-1B6EF3776349}"/>
+              </a:ext>
+            </a:extLst>
+          </p:cNvPr>
+          <p:cNvSpPr txBox="1"/>
+          <p:nvPr/>
+        </p:nvSpPr>
+        <p:spPr>
+          <a:xfrm>
+            <a:off x="3873212" y="486666"/>
+            <a:ext cx="4445576" cy="369332"/>
+          </a:xfrm>
+          <a:prstGeom prst="rect">
+            <a:avLst/>
+          </a:prstGeom>
+          <a:noFill/>
+        </p:spPr>
+        <p:txBody>
+          <a:bodyPr wrap="none" rtlCol="0">
+            <a:spAutoFit/>
+          </a:bodyPr>
+          <a:lstStyle/>
+          <a:p>
+            <a:r>
+              <a:rPr lang="en-GB" dirty="0">
+                <a:ea typeface="Adobe Fan Heiti Std B" panose="020B0700000000000000"/>
+              </a:rPr>
+              <a:t>Switch 1 flows after initialization but no Login</a:t>
+            </a:r>
+          </a:p>
+        </p:txBody>
+      </p:sp>
+    </p:spTree>
+    <p:extLst>
+      <p:ext uri="{BB962C8B-B14F-4D97-AF65-F5344CB8AC3E}">
+        <p14:creationId xmlns:p14="http://schemas.microsoft.com/office/powerpoint/2010/main" val="368946314"/>
+      </p:ext>
+    </p:extLst>
+  </p:cSld>
+  <p:clrMapOvr>
+    <a:masterClrMapping/>
+  </p:clrMapOvr>
+</p:sld>
+</file>
+
+<file path=ppt/slides/slide14.xml><?xml version="1.0" encoding="utf-8"?>
+<p:sld xmlns:a="http://schemas.openxmlformats.org/drawingml/2006/main" xmlns:r="http://schemas.openxmlformats.org/officeDocument/2006/relationships" xmlns:p="http://schemas.openxmlformats.org/presentationml/2006/main">
+  <p:cSld>
+    <p:spTree>
+      <p:nvGrpSpPr>
+        <p:cNvPr id="1" name=""/>
+        <p:cNvGrpSpPr/>
+        <p:nvPr/>
+      </p:nvGrpSpPr>
+      <p:grpSpPr>
+        <a:xfrm>
+          <a:off x="0" y="0"/>
+          <a:ext cx="0" cy="0"/>
+          <a:chOff x="0" y="0"/>
+          <a:chExt cx="0" cy="0"/>
+        </a:xfrm>
+      </p:grpSpPr>
+      <p:pic>
+        <p:nvPicPr>
+          <p:cNvPr id="5" name="Content Placeholder 4">
+            <a:extLst>
+              <a:ext uri="{FF2B5EF4-FFF2-40B4-BE49-F238E27FC236}">
+                <a16:creationId xmlns:a16="http://schemas.microsoft.com/office/drawing/2014/main" id="{5EFB2E3B-B947-540B-8B50-076CCB85C243}"/>
+              </a:ext>
+            </a:extLst>
+          </p:cNvPr>
+          <p:cNvPicPr>
+            <a:picLocks noGrp="1" noChangeAspect="1"/>
+          </p:cNvPicPr>
+          <p:nvPr>
+            <p:ph idx="1"/>
+          </p:nvPr>
+        </p:nvPicPr>
+        <p:blipFill>
+          <a:blip r:embed="rId2"/>
+          <a:stretch>
+            <a:fillRect/>
+          </a:stretch>
+        </p:blipFill>
+        <p:spPr>
+          <a:xfrm>
+            <a:off x="838200" y="247998"/>
+            <a:ext cx="10515600" cy="2229197"/>
+          </a:xfrm>
+        </p:spPr>
+      </p:pic>
+      <p:pic>
+        <p:nvPicPr>
+          <p:cNvPr id="6" name="Picture 5">
+            <a:extLst>
+              <a:ext uri="{FF2B5EF4-FFF2-40B4-BE49-F238E27FC236}">
+                <a16:creationId xmlns:a16="http://schemas.microsoft.com/office/drawing/2014/main" id="{BA121C45-BF0C-08F8-95A3-D519A47CCCA8}"/>
+              </a:ext>
+            </a:extLst>
+          </p:cNvPr>
+          <p:cNvPicPr>
+            <a:picLocks noChangeAspect="1"/>
+          </p:cNvPicPr>
+          <p:nvPr/>
+        </p:nvPicPr>
+        <p:blipFill>
+          <a:blip r:embed="rId3"/>
+          <a:stretch>
+            <a:fillRect/>
+          </a:stretch>
+        </p:blipFill>
+        <p:spPr>
+          <a:xfrm>
+            <a:off x="838200" y="2586447"/>
+            <a:ext cx="4724878" cy="1669762"/>
+          </a:xfrm>
+          <a:prstGeom prst="rect">
+            <a:avLst/>
+          </a:prstGeom>
+        </p:spPr>
+      </p:pic>
+      <p:pic>
+        <p:nvPicPr>
+          <p:cNvPr id="8" name="Picture 7">
+            <a:extLst>
+              <a:ext uri="{FF2B5EF4-FFF2-40B4-BE49-F238E27FC236}">
+                <a16:creationId xmlns:a16="http://schemas.microsoft.com/office/drawing/2014/main" id="{D5CC0A84-98BC-DD89-89D0-93BE70055884}"/>
+              </a:ext>
+            </a:extLst>
+          </p:cNvPr>
+          <p:cNvPicPr>
+            <a:picLocks noChangeAspect="1"/>
+          </p:cNvPicPr>
+          <p:nvPr/>
+        </p:nvPicPr>
+        <p:blipFill rotWithShape="1">
+          <a:blip r:embed="rId4"/>
+          <a:srcRect t="10148" b="8948"/>
+          <a:stretch/>
+        </p:blipFill>
+        <p:spPr>
+          <a:xfrm>
+            <a:off x="5563078" y="4256209"/>
+            <a:ext cx="6012314" cy="1933304"/>
+          </a:xfrm>
+          <a:prstGeom prst="rect">
+            <a:avLst/>
+          </a:prstGeom>
+        </p:spPr>
+      </p:pic>
+      <p:sp>
+        <p:nvSpPr>
+          <p:cNvPr id="9" name="TextBox 8">
+            <a:extLst>
+              <a:ext uri="{FF2B5EF4-FFF2-40B4-BE49-F238E27FC236}">
+                <a16:creationId xmlns:a16="http://schemas.microsoft.com/office/drawing/2014/main" id="{AFFA02FE-61D8-CFB7-2BE0-D8985BE2EFC9}"/>
+              </a:ext>
+            </a:extLst>
+          </p:cNvPr>
+          <p:cNvSpPr txBox="1"/>
+          <p:nvPr/>
+        </p:nvSpPr>
+        <p:spPr>
+          <a:xfrm>
+            <a:off x="8452685" y="2477195"/>
+            <a:ext cx="2901115" cy="369332"/>
+          </a:xfrm>
+          <a:prstGeom prst="rect">
+            <a:avLst/>
+          </a:prstGeom>
+          <a:noFill/>
+        </p:spPr>
+        <p:txBody>
+          <a:bodyPr wrap="none" rtlCol="0">
+            <a:spAutoFit/>
+          </a:bodyPr>
+          <a:lstStyle/>
+          <a:p>
+            <a:r>
+              <a:rPr lang="en-GB" dirty="0">
+                <a:ea typeface="Adobe Fan Heiti Std B" panose="020B0700000000000000"/>
+              </a:rPr>
+              <a:t>Packets from host 3 to host 1</a:t>
+            </a:r>
+          </a:p>
+        </p:txBody>
+      </p:sp>
+      <p:sp>
+        <p:nvSpPr>
+          <p:cNvPr id="10" name="TextBox 9">
+            <a:extLst>
+              <a:ext uri="{FF2B5EF4-FFF2-40B4-BE49-F238E27FC236}">
+                <a16:creationId xmlns:a16="http://schemas.microsoft.com/office/drawing/2014/main" id="{ADD7AB82-1EA5-DA64-43A5-2F41B054DED2}"/>
+              </a:ext>
+            </a:extLst>
+          </p:cNvPr>
+          <p:cNvSpPr txBox="1"/>
+          <p:nvPr/>
+        </p:nvSpPr>
+        <p:spPr>
+          <a:xfrm>
+            <a:off x="1881051" y="4365461"/>
+            <a:ext cx="2133405" cy="369332"/>
+          </a:xfrm>
+          <a:prstGeom prst="rect">
+            <a:avLst/>
+          </a:prstGeom>
+          <a:noFill/>
+        </p:spPr>
+        <p:txBody>
+          <a:bodyPr wrap="none" rtlCol="0">
+            <a:spAutoFit/>
+          </a:bodyPr>
+          <a:lstStyle/>
+          <a:p>
+            <a:r>
+              <a:rPr lang="en-GB" dirty="0"/>
+              <a:t>host 3 </a:t>
+            </a:r>
+            <a:r>
+              <a:rPr lang="en-GB" dirty="0" err="1"/>
+              <a:t>Xterm</a:t>
+            </a:r>
+            <a:r>
+              <a:rPr lang="en-GB" dirty="0"/>
+              <a:t> output </a:t>
+            </a:r>
+          </a:p>
+        </p:txBody>
+      </p:sp>
+      <p:sp>
+        <p:nvSpPr>
+          <p:cNvPr id="12" name="TextBox 11">
+            <a:extLst>
+              <a:ext uri="{FF2B5EF4-FFF2-40B4-BE49-F238E27FC236}">
+                <a16:creationId xmlns:a16="http://schemas.microsoft.com/office/drawing/2014/main" id="{8DF2C679-315B-DD17-A4C3-8D21EFDD1DAC}"/>
+              </a:ext>
+            </a:extLst>
+          </p:cNvPr>
+          <p:cNvSpPr txBox="1"/>
+          <p:nvPr/>
+        </p:nvSpPr>
+        <p:spPr>
+          <a:xfrm>
+            <a:off x="7809091" y="6288161"/>
+            <a:ext cx="1520288" cy="369332"/>
+          </a:xfrm>
+          <a:prstGeom prst="rect">
+            <a:avLst/>
+          </a:prstGeom>
+          <a:noFill/>
+        </p:spPr>
+        <p:txBody>
+          <a:bodyPr wrap="none" rtlCol="0">
+            <a:spAutoFit/>
+          </a:bodyPr>
+          <a:lstStyle/>
+          <a:p>
+            <a:r>
+              <a:rPr lang="en-GB" dirty="0"/>
+              <a:t>Switch 3 flows</a:t>
+            </a:r>
+          </a:p>
+        </p:txBody>
+      </p:sp>
+    </p:spTree>
+    <p:extLst>
+      <p:ext uri="{BB962C8B-B14F-4D97-AF65-F5344CB8AC3E}">
+        <p14:creationId xmlns:p14="http://schemas.microsoft.com/office/powerpoint/2010/main" val="2984085972"/>
+      </p:ext>
+    </p:extLst>
+  </p:cSld>
+  <p:clrMapOvr>
+    <a:masterClrMapping/>
+  </p:clrMapOvr>
+</p:sld>
+</file>
+
+<file path=ppt/slides/slide15.xml><?xml version="1.0" encoding="utf-8"?>
+<p:sld xmlns:a="http://schemas.openxmlformats.org/drawingml/2006/main" xmlns:r="http://schemas.openxmlformats.org/officeDocument/2006/relationships" xmlns:p="http://schemas.openxmlformats.org/presentationml/2006/main">
+  <p:cSld>
+    <p:spTree>
+      <p:nvGrpSpPr>
+        <p:cNvPr id="1" name=""/>
+        <p:cNvGrpSpPr/>
+        <p:nvPr/>
+      </p:nvGrpSpPr>
+      <p:grpSpPr>
+        <a:xfrm>
+          <a:off x="0" y="0"/>
+          <a:ext cx="0" cy="0"/>
+          <a:chOff x="0" y="0"/>
+          <a:chExt cx="0" cy="0"/>
+        </a:xfrm>
+      </p:grpSpPr>
       <p:sp>
         <p:nvSpPr>
           <p:cNvPr id="2" name="Title 1">
@@ -8719,7 +9933,7 @@
 </p:sld>
 </file>
 
-<file path=ppt/slides/slide14.xml><?xml version="1.0" encoding="utf-8"?>
+<file path=ppt/slides/slide16.xml><?xml version="1.0" encoding="utf-8"?>
 <p:sld xmlns:a="http://schemas.openxmlformats.org/drawingml/2006/main" xmlns:r="http://schemas.openxmlformats.org/officeDocument/2006/relationships" xmlns:p="http://schemas.openxmlformats.org/presentationml/2006/main">
   <p:cSld>
     <p:spTree>
@@ -8949,7 +10163,7 @@
 </p:sld>
 </file>
 
-<file path=ppt/slides/slide15.xml><?xml version="1.0" encoding="utf-8"?>
+<file path=ppt/slides/slide17.xml><?xml version="1.0" encoding="utf-8"?>
 <p:sld xmlns:a="http://schemas.openxmlformats.org/drawingml/2006/main" xmlns:r="http://schemas.openxmlformats.org/officeDocument/2006/relationships" xmlns:p="http://schemas.openxmlformats.org/presentationml/2006/main">
   <p:cSld>
     <p:spTree>
@@ -9107,7 +10321,7 @@
 </p:sld>
 </file>
 
-<file path=ppt/slides/slide16.xml><?xml version="1.0" encoding="utf-8"?>
+<file path=ppt/slides/slide18.xml><?xml version="1.0" encoding="utf-8"?>
 <p:sld xmlns:a="http://schemas.openxmlformats.org/drawingml/2006/main" xmlns:r="http://schemas.openxmlformats.org/officeDocument/2006/relationships" xmlns:p="http://schemas.openxmlformats.org/presentationml/2006/main">
   <p:cSld>
     <p:spTree>
@@ -9129,7 +10343,7 @@
           <p:cNvPr id="2" name="Title 1">
             <a:extLst>
               <a:ext uri="{FF2B5EF4-FFF2-40B4-BE49-F238E27FC236}">
-                <a16:creationId xmlns:a16="http://schemas.microsoft.com/office/drawing/2014/main" id="{A8AC7FB0-615D-C6AE-C312-FDECA9163386}"/>
+                <a16:creationId xmlns:a16="http://schemas.microsoft.com/office/drawing/2014/main" id="{3A88E6A1-3150-378A-5271-EAEC024BE4F3}"/>
               </a:ext>
             </a:extLst>
           </p:cNvPr>
@@ -9137,130 +10351,34 @@
             <a:spLocks noGrp="1"/>
           </p:cNvSpPr>
           <p:nvPr>
-            <p:ph type="title"/>
-          </p:nvPr>
-        </p:nvSpPr>
-        <p:spPr/>
-        <p:txBody>
-          <a:bodyPr/>
-          <a:lstStyle/>
-          <a:p>
-            <a:r>
-              <a:rPr lang="en-GB" dirty="0"/>
-              <a:t>Demonstration 	</a:t>
-            </a:r>
-          </a:p>
-        </p:txBody>
-      </p:sp>
-      <p:sp>
-        <p:nvSpPr>
-          <p:cNvPr id="3" name="Content Placeholder 2">
-            <a:extLst>
-              <a:ext uri="{FF2B5EF4-FFF2-40B4-BE49-F238E27FC236}">
-                <a16:creationId xmlns:a16="http://schemas.microsoft.com/office/drawing/2014/main" id="{3ADDCE65-D689-9D20-3A94-C1085BD28A55}"/>
-              </a:ext>
-            </a:extLst>
-          </p:cNvPr>
-          <p:cNvSpPr>
-            <a:spLocks noGrp="1"/>
-          </p:cNvSpPr>
-          <p:nvPr>
-            <p:ph idx="1"/>
+            <p:ph type="ctrTitle"/>
           </p:nvPr>
         </p:nvSpPr>
         <p:spPr>
           <a:xfrm>
-            <a:off x="838200" y="1601788"/>
-            <a:ext cx="10515600" cy="4351338"/>
+            <a:off x="1524000" y="1514248"/>
+            <a:ext cx="9144000" cy="2387600"/>
           </a:xfrm>
         </p:spPr>
         <p:txBody>
           <a:bodyPr>
-            <a:normAutofit lnSpcReduction="10000"/>
+            <a:normAutofit/>
           </a:bodyPr>
           <a:lstStyle/>
           <a:p>
             <a:r>
-              <a:rPr lang="en-GB" dirty="0"/>
-              <a:t>1. Start ONOS and MININET </a:t>
-            </a:r>
-          </a:p>
-          <a:p>
-            <a:r>
-              <a:rPr lang="en-GB" dirty="0"/>
-              <a:t>Start FLASK </a:t>
-            </a:r>
-          </a:p>
-          <a:p>
-            <a:r>
-              <a:rPr lang="en-GB" dirty="0"/>
-              <a:t>Try pinging h1 from h3 (</a:t>
-            </a:r>
-            <a:r>
-              <a:rPr lang="en-GB" dirty="0" err="1"/>
-              <a:t>wirehsark</a:t>
-            </a:r>
-            <a:r>
-              <a:rPr lang="en-GB" dirty="0"/>
-              <a:t> the connection – s1 and s3 no packets) (h1-s1 packets). (s1 drops it)</a:t>
-            </a:r>
-          </a:p>
-          <a:p>
-            <a:pPr lvl="1"/>
-            <a:r>
-              <a:rPr lang="en-GB" dirty="0"/>
-              <a:t>Flow rules table (devices s1 and s3)</a:t>
-            </a:r>
-          </a:p>
-          <a:p>
-            <a:r>
-              <a:rPr lang="en-GB" dirty="0"/>
-              <a:t>Authenticate h1 (</a:t>
-            </a:r>
-            <a:r>
-              <a:rPr lang="en-GB" dirty="0" err="1"/>
-              <a:t>wirehshark</a:t>
-            </a:r>
-            <a:r>
-              <a:rPr lang="en-GB" dirty="0"/>
-              <a:t> same connection, h1 ping h3)(s1 and s3 packets from h1). </a:t>
-            </a:r>
-          </a:p>
-          <a:p>
-            <a:r>
-              <a:rPr lang="en-GB" dirty="0"/>
-              <a:t>Flow rules table s1 (no action is removed, OUTPUT added)(NOACTION for s2). </a:t>
-            </a:r>
-          </a:p>
-          <a:p>
-            <a:r>
-              <a:rPr lang="en-GB" dirty="0"/>
-              <a:t>Authenticate h3 and ping h1 or others. (</a:t>
-            </a:r>
-            <a:r>
-              <a:rPr lang="en-GB" dirty="0" err="1"/>
-              <a:t>wireshark</a:t>
-            </a:r>
-            <a:r>
-              <a:rPr lang="en-GB" dirty="0"/>
-              <a:t>) </a:t>
-            </a:r>
-          </a:p>
-          <a:p>
-            <a:pPr marL="0" indent="0">
-              <a:buNone/>
-            </a:pPr>
-            <a:endParaRPr lang="en-GB" dirty="0"/>
-          </a:p>
-          <a:p>
-            <a:endParaRPr lang="en-GB" dirty="0"/>
+              <a:rPr lang="en-GB" sz="4400" dirty="0">
+                <a:ea typeface="Adobe Fan Heiti Std B" panose="020B0700000000000000"/>
+              </a:rPr>
+              <a:t>Thank you for listening</a:t>
+            </a:r>
           </a:p>
         </p:txBody>
       </p:sp>
     </p:spTree>
     <p:extLst>
       <p:ext uri="{BB962C8B-B14F-4D97-AF65-F5344CB8AC3E}">
-        <p14:creationId xmlns:p14="http://schemas.microsoft.com/office/powerpoint/2010/main" val="2454163085"/>
+        <p14:creationId xmlns:p14="http://schemas.microsoft.com/office/powerpoint/2010/main" val="321469141"/>
       </p:ext>
     </p:extLst>
   </p:cSld>
@@ -10149,10 +11267,10 @@
       </p:grpSpPr>
       <p:pic>
         <p:nvPicPr>
-          <p:cNvPr id="8" name="Picture 7">
+          <p:cNvPr id="5" name="Picture 4">
             <a:extLst>
               <a:ext uri="{FF2B5EF4-FFF2-40B4-BE49-F238E27FC236}">
-                <a16:creationId xmlns:a16="http://schemas.microsoft.com/office/drawing/2014/main" id="{1F0AB2C2-FAB7-ED2D-BDFB-08EECC12F13D}"/>
+                <a16:creationId xmlns:a16="http://schemas.microsoft.com/office/drawing/2014/main" id="{DD1376CB-1416-08A9-FC89-02F9FFB19CB6}"/>
               </a:ext>
             </a:extLst>
           </p:cNvPr>
@@ -10169,48 +11287,332 @@
         </p:blipFill>
         <p:spPr>
           <a:xfrm>
-            <a:off x="0" y="33707"/>
-            <a:ext cx="7828292" cy="3023001"/>
+            <a:off x="3125089" y="511381"/>
+            <a:ext cx="5941822" cy="2288155"/>
           </a:xfrm>
           <a:prstGeom prst="rect">
             <a:avLst/>
           </a:prstGeom>
         </p:spPr>
       </p:pic>
+      <p:sp>
+        <p:nvSpPr>
+          <p:cNvPr id="6" name="TextBox 5">
+            <a:extLst>
+              <a:ext uri="{FF2B5EF4-FFF2-40B4-BE49-F238E27FC236}">
+                <a16:creationId xmlns:a16="http://schemas.microsoft.com/office/drawing/2014/main" id="{3401CA7C-D6A2-FE14-A1D6-DFCE66F982F1}"/>
+              </a:ext>
+            </a:extLst>
+          </p:cNvPr>
+          <p:cNvSpPr txBox="1"/>
+          <p:nvPr/>
+        </p:nvSpPr>
+        <p:spPr>
+          <a:xfrm>
+            <a:off x="4205462" y="2799536"/>
+            <a:ext cx="3500846" cy="369332"/>
+          </a:xfrm>
+          <a:prstGeom prst="rect">
+            <a:avLst/>
+          </a:prstGeom>
+          <a:noFill/>
+        </p:spPr>
+        <p:txBody>
+          <a:bodyPr wrap="square" rtlCol="0">
+            <a:spAutoFit/>
+          </a:bodyPr>
+          <a:lstStyle/>
+          <a:p>
+            <a:r>
+              <a:rPr lang="en-GB" dirty="0">
+                <a:ea typeface="Adobe Fan Heiti Std B" panose="020B0700000000000000"/>
+              </a:rPr>
+              <a:t>Flask server UI for authentication</a:t>
+            </a:r>
+          </a:p>
+        </p:txBody>
+      </p:sp>
       <p:pic>
         <p:nvPicPr>
-          <p:cNvPr id="10" name="Picture 9">
+          <p:cNvPr id="1026" name="Picture 2" descr="ONOS - Wikipedia">
             <a:extLst>
               <a:ext uri="{FF2B5EF4-FFF2-40B4-BE49-F238E27FC236}">
-                <a16:creationId xmlns:a16="http://schemas.microsoft.com/office/drawing/2014/main" id="{56A2090C-9F2E-C6BD-27C3-16A0F351BFC4}"/>
+                <a16:creationId xmlns:a16="http://schemas.microsoft.com/office/drawing/2014/main" id="{8BC0B48B-2A44-BEF3-3FE3-9AAC5FE40A22}"/>
               </a:ext>
             </a:extLst>
           </p:cNvPr>
           <p:cNvPicPr>
-            <a:picLocks noChangeAspect="1"/>
+            <a:picLocks noChangeAspect="1" noChangeArrowheads="1"/>
           </p:cNvPicPr>
           <p:nvPr/>
         </p:nvPicPr>
         <p:blipFill>
-          <a:blip r:embed="rId3"/>
+          <a:blip r:embed="rId3">
+            <a:extLst>
+              <a:ext uri="{28A0092B-C50C-407E-A947-70E740481C1C}">
+                <a14:useLocalDpi xmlns:a14="http://schemas.microsoft.com/office/drawing/2010/main" val="0"/>
+              </a:ext>
+            </a:extLst>
+          </a:blip>
+          <a:srcRect/>
           <a:stretch>
             <a:fillRect/>
           </a:stretch>
         </p:blipFill>
-        <p:spPr>
+        <p:spPr bwMode="auto">
           <a:xfrm>
-            <a:off x="0" y="2902056"/>
-            <a:ext cx="4880513" cy="3955944"/>
+            <a:off x="7941438" y="3429000"/>
+            <a:ext cx="3559303" cy="2362083"/>
           </a:xfrm>
           <a:prstGeom prst="rect">
             <a:avLst/>
           </a:prstGeom>
+          <a:noFill/>
+          <a:extLst>
+            <a:ext uri="{909E8E84-426E-40DD-AFC4-6F175D3DCCD1}">
+              <a14:hiddenFill xmlns:a14="http://schemas.microsoft.com/office/drawing/2010/main">
+                <a:solidFill>
+                  <a:srgbClr val="FFFFFF"/>
+                </a:solidFill>
+              </a14:hiddenFill>
+            </a:ext>
+          </a:extLst>
         </p:spPr>
       </p:pic>
+      <p:pic>
+        <p:nvPicPr>
+          <p:cNvPr id="1028" name="Picture 4" descr="Álvaro Bezares Design">
+            <a:extLst>
+              <a:ext uri="{FF2B5EF4-FFF2-40B4-BE49-F238E27FC236}">
+                <a16:creationId xmlns:a16="http://schemas.microsoft.com/office/drawing/2014/main" id="{6BA9B9CB-6ACB-91CE-E089-CF028AC37C44}"/>
+              </a:ext>
+            </a:extLst>
+          </p:cNvPr>
+          <p:cNvPicPr>
+            <a:picLocks noChangeAspect="1" noChangeArrowheads="1"/>
+          </p:cNvPicPr>
+          <p:nvPr/>
+        </p:nvPicPr>
+        <p:blipFill rotWithShape="1">
+          <a:blip r:embed="rId4">
+            <a:extLst>
+              <a:ext uri="{28A0092B-C50C-407E-A947-70E740481C1C}">
+                <a14:useLocalDpi xmlns:a14="http://schemas.microsoft.com/office/drawing/2010/main" val="0"/>
+              </a:ext>
+            </a:extLst>
+          </a:blip>
+          <a:srcRect l="13028" t="30389" r="13086" b="36697"/>
+          <a:stretch/>
+        </p:blipFill>
+        <p:spPr bwMode="auto">
+          <a:xfrm>
+            <a:off x="509454" y="4460418"/>
+            <a:ext cx="4505908" cy="1254545"/>
+          </a:xfrm>
+          <a:prstGeom prst="rect">
+            <a:avLst/>
+          </a:prstGeom>
+          <a:noFill/>
+          <a:extLst>
+            <a:ext uri="{909E8E84-426E-40DD-AFC4-6F175D3DCCD1}">
+              <a14:hiddenFill xmlns:a14="http://schemas.microsoft.com/office/drawing/2010/main">
+                <a:solidFill>
+                  <a:srgbClr val="FFFFFF"/>
+                </a:solidFill>
+              </a14:hiddenFill>
+            </a:ext>
+          </a:extLst>
+        </p:spPr>
+      </p:pic>
+      <p:sp>
+        <p:nvSpPr>
+          <p:cNvPr id="7" name="Arrow: Left-Right 6">
+            <a:extLst>
+              <a:ext uri="{FF2B5EF4-FFF2-40B4-BE49-F238E27FC236}">
+                <a16:creationId xmlns:a16="http://schemas.microsoft.com/office/drawing/2014/main" id="{0B68C9AA-15E0-2D6D-B5A9-4B61C895786A}"/>
+              </a:ext>
+            </a:extLst>
+          </p:cNvPr>
+          <p:cNvSpPr/>
+          <p:nvPr/>
+        </p:nvSpPr>
+        <p:spPr>
+          <a:xfrm>
+            <a:off x="5335011" y="4649867"/>
+            <a:ext cx="2286778" cy="807156"/>
+          </a:xfrm>
+          <a:prstGeom prst="leftRightArrow">
+            <a:avLst/>
+          </a:prstGeom>
+        </p:spPr>
+        <p:style>
+          <a:lnRef idx="2">
+            <a:schemeClr val="accent1">
+              <a:shade val="15000"/>
+            </a:schemeClr>
+          </a:lnRef>
+          <a:fillRef idx="1">
+            <a:schemeClr val="accent1"/>
+          </a:fillRef>
+          <a:effectRef idx="0">
+            <a:schemeClr val="accent1"/>
+          </a:effectRef>
+          <a:fontRef idx="minor">
+            <a:schemeClr val="lt1"/>
+          </a:fontRef>
+        </p:style>
+        <p:txBody>
+          <a:bodyPr rtlCol="0" anchor="ctr"/>
+          <a:lstStyle/>
+          <a:p>
+            <a:pPr algn="ctr"/>
+            <a:endParaRPr lang="en-GB"/>
+          </a:p>
+        </p:txBody>
+      </p:sp>
+      <p:sp>
+        <p:nvSpPr>
+          <p:cNvPr id="9" name="Arrow: Up 8">
+            <a:extLst>
+              <a:ext uri="{FF2B5EF4-FFF2-40B4-BE49-F238E27FC236}">
+                <a16:creationId xmlns:a16="http://schemas.microsoft.com/office/drawing/2014/main" id="{CEB69812-DDF7-21FD-B801-9FD4BFCB18FC}"/>
+              </a:ext>
+            </a:extLst>
+          </p:cNvPr>
+          <p:cNvSpPr/>
+          <p:nvPr/>
+        </p:nvSpPr>
+        <p:spPr>
+          <a:xfrm>
+            <a:off x="5985976" y="3392169"/>
+            <a:ext cx="984848" cy="1695522"/>
+          </a:xfrm>
+          <a:prstGeom prst="upArrow">
+            <a:avLst/>
+          </a:prstGeom>
+          <a:solidFill>
+            <a:srgbClr val="FF0000"/>
+          </a:solidFill>
+        </p:spPr>
+        <p:style>
+          <a:lnRef idx="2">
+            <a:schemeClr val="accent1">
+              <a:shade val="15000"/>
+            </a:schemeClr>
+          </a:lnRef>
+          <a:fillRef idx="1">
+            <a:schemeClr val="accent1"/>
+          </a:fillRef>
+          <a:effectRef idx="0">
+            <a:schemeClr val="accent1"/>
+          </a:effectRef>
+          <a:fontRef idx="minor">
+            <a:schemeClr val="lt1"/>
+          </a:fontRef>
+        </p:style>
+        <p:txBody>
+          <a:bodyPr rtlCol="0" anchor="ctr"/>
+          <a:lstStyle/>
+          <a:p>
+            <a:pPr algn="ctr"/>
+            <a:endParaRPr lang="en-GB"/>
+          </a:p>
+        </p:txBody>
+      </p:sp>
+      <p:sp>
+        <p:nvSpPr>
+          <p:cNvPr id="10" name="TextBox 9">
+            <a:extLst>
+              <a:ext uri="{FF2B5EF4-FFF2-40B4-BE49-F238E27FC236}">
+                <a16:creationId xmlns:a16="http://schemas.microsoft.com/office/drawing/2014/main" id="{12C5288D-A280-6223-87E1-BBF6B13293A2}"/>
+              </a:ext>
+            </a:extLst>
+          </p:cNvPr>
+          <p:cNvSpPr txBox="1"/>
+          <p:nvPr/>
+        </p:nvSpPr>
+        <p:spPr>
+          <a:xfrm>
+            <a:off x="4325470" y="5922359"/>
+            <a:ext cx="4305859" cy="646331"/>
+          </a:xfrm>
+          <a:prstGeom prst="rect">
+            <a:avLst/>
+          </a:prstGeom>
+          <a:noFill/>
+        </p:spPr>
+        <p:txBody>
+          <a:bodyPr wrap="none" rtlCol="0">
+            <a:spAutoFit/>
+          </a:bodyPr>
+          <a:lstStyle/>
+          <a:p>
+            <a:r>
+              <a:rPr lang="en-GB" dirty="0">
+                <a:ea typeface="Adobe Fan Heiti Std B" panose="020B0700000000000000"/>
+              </a:rPr>
+              <a:t>Sits at the interface of ONOS and MININET, </a:t>
+            </a:r>
+          </a:p>
+          <a:p>
+            <a:r>
+              <a:rPr lang="en-GB" dirty="0">
+                <a:ea typeface="Adobe Fan Heiti Std B" panose="020B0700000000000000"/>
+              </a:rPr>
+              <a:t>Higher overview of controller and Topology</a:t>
+            </a:r>
+          </a:p>
+        </p:txBody>
+      </p:sp>
+      <p:sp>
+        <p:nvSpPr>
+          <p:cNvPr id="11" name="TextBox 10">
+            <a:extLst>
+              <a:ext uri="{FF2B5EF4-FFF2-40B4-BE49-F238E27FC236}">
+                <a16:creationId xmlns:a16="http://schemas.microsoft.com/office/drawing/2014/main" id="{87C00CE2-9BED-7ED2-6CED-5B5A15A5A672}"/>
+              </a:ext>
+            </a:extLst>
+          </p:cNvPr>
+          <p:cNvSpPr txBox="1"/>
+          <p:nvPr/>
+        </p:nvSpPr>
+        <p:spPr>
+          <a:xfrm>
+            <a:off x="509454" y="511381"/>
+            <a:ext cx="2455815" cy="707886"/>
+          </a:xfrm>
+          <a:prstGeom prst="rect">
+            <a:avLst/>
+          </a:prstGeom>
+          <a:noFill/>
+        </p:spPr>
+        <p:txBody>
+          <a:bodyPr wrap="square" rtlCol="0">
+            <a:spAutoFit/>
+          </a:bodyPr>
+          <a:lstStyle/>
+          <a:p>
+            <a:r>
+              <a:rPr lang="en-GB" sz="2000" b="1" dirty="0">
+                <a:ea typeface="Adobe Fan Heiti Std B" panose="020B0700000000000000"/>
+              </a:rPr>
+              <a:t>Understanding the</a:t>
+            </a:r>
+          </a:p>
+          <a:p>
+            <a:r>
+              <a:rPr lang="en-GB" sz="2000" b="1" dirty="0">
+                <a:ea typeface="Adobe Fan Heiti Std B" panose="020B0700000000000000"/>
+              </a:rPr>
+              <a:t>working elements</a:t>
+            </a:r>
+          </a:p>
+        </p:txBody>
+      </p:sp>
     </p:spTree>
     <p:extLst>
       <p:ext uri="{BB962C8B-B14F-4D97-AF65-F5344CB8AC3E}">
-        <p14:creationId xmlns:p14="http://schemas.microsoft.com/office/powerpoint/2010/main" val="3181290772"/>
+        <p14:creationId xmlns:p14="http://schemas.microsoft.com/office/powerpoint/2010/main" val="274276022"/>
       </p:ext>
     </p:extLst>
   </p:cSld>
@@ -11144,4 +12546,299 @@
     </a:ext>
   </a:extLst>
 </a:theme>
+</file>
+
+<file path=ppt/theme/theme2.xml><?xml version="1.0" encoding="utf-8"?>
+<a:theme xmlns:a="http://schemas.openxmlformats.org/drawingml/2006/main" name="Office Theme">
+  <a:themeElements>
+    <a:clrScheme name="Office">
+      <a:dk1>
+        <a:sysClr val="windowText" lastClr="000000"/>
+      </a:dk1>
+      <a:lt1>
+        <a:sysClr val="window" lastClr="FFFFFF"/>
+      </a:lt1>
+      <a:dk2>
+        <a:srgbClr val="44546A"/>
+      </a:dk2>
+      <a:lt2>
+        <a:srgbClr val="E7E6E6"/>
+      </a:lt2>
+      <a:accent1>
+        <a:srgbClr val="4472C4"/>
+      </a:accent1>
+      <a:accent2>
+        <a:srgbClr val="ED7D31"/>
+      </a:accent2>
+      <a:accent3>
+        <a:srgbClr val="A5A5A5"/>
+      </a:accent3>
+      <a:accent4>
+        <a:srgbClr val="FFC000"/>
+      </a:accent4>
+      <a:accent5>
+        <a:srgbClr val="5B9BD5"/>
+      </a:accent5>
+      <a:accent6>
+        <a:srgbClr val="70AD47"/>
+      </a:accent6>
+      <a:hlink>
+        <a:srgbClr val="0563C1"/>
+      </a:hlink>
+      <a:folHlink>
+        <a:srgbClr val="954F72"/>
+      </a:folHlink>
+    </a:clrScheme>
+    <a:fontScheme name="Office">
+      <a:majorFont>
+        <a:latin typeface="Calibri Light" panose="020F0302020204030204"/>
+        <a:ea typeface=""/>
+        <a:cs typeface=""/>
+        <a:font script="Jpan" typeface="游ゴシック Light"/>
+        <a:font script="Hang" typeface="맑은 고딕"/>
+        <a:font script="Hans" typeface="等线 Light"/>
+        <a:font script="Hant" typeface="新細明體"/>
+        <a:font script="Arab" typeface="Times New Roman"/>
+        <a:font script="Hebr" typeface="Times New Roman"/>
+        <a:font script="Thai" typeface="Angsana New"/>
+        <a:font script="Ethi" typeface="Nyala"/>
+        <a:font script="Beng" typeface="Vrinda"/>
+        <a:font script="Gujr" typeface="Shruti"/>
+        <a:font script="Khmr" typeface="MoolBoran"/>
+        <a:font script="Knda" typeface="Tunga"/>
+        <a:font script="Guru" typeface="Raavi"/>
+        <a:font script="Cans" typeface="Euphemia"/>
+        <a:font script="Cher" typeface="Plantagenet Cherokee"/>
+        <a:font script="Yiii" typeface="Microsoft Yi Baiti"/>
+        <a:font script="Tibt" typeface="Microsoft Himalaya"/>
+        <a:font script="Thaa" typeface="MV Boli"/>
+        <a:font script="Deva" typeface="Mangal"/>
+        <a:font script="Telu" typeface="Gautami"/>
+        <a:font script="Taml" typeface="Latha"/>
+        <a:font script="Syrc" typeface="Estrangelo Edessa"/>
+        <a:font script="Orya" typeface="Kalinga"/>
+        <a:font script="Mlym" typeface="Kartika"/>
+        <a:font script="Laoo" typeface="DokChampa"/>
+        <a:font script="Sinh" typeface="Iskoola Pota"/>
+        <a:font script="Mong" typeface="Mongolian Baiti"/>
+        <a:font script="Viet" typeface="Times New Roman"/>
+        <a:font script="Uigh" typeface="Microsoft Uighur"/>
+        <a:font script="Geor" typeface="Sylfaen"/>
+        <a:font script="Armn" typeface="Arial"/>
+        <a:font script="Bugi" typeface="Leelawadee UI"/>
+        <a:font script="Bopo" typeface="Microsoft JhengHei"/>
+        <a:font script="Java" typeface="Javanese Text"/>
+        <a:font script="Lisu" typeface="Segoe UI"/>
+        <a:font script="Mymr" typeface="Myanmar Text"/>
+        <a:font script="Nkoo" typeface="Ebrima"/>
+        <a:font script="Olck" typeface="Nirmala UI"/>
+        <a:font script="Osma" typeface="Ebrima"/>
+        <a:font script="Phag" typeface="Phagspa"/>
+        <a:font script="Syrn" typeface="Estrangelo Edessa"/>
+        <a:font script="Syrj" typeface="Estrangelo Edessa"/>
+        <a:font script="Syre" typeface="Estrangelo Edessa"/>
+        <a:font script="Sora" typeface="Nirmala UI"/>
+        <a:font script="Tale" typeface="Microsoft Tai Le"/>
+        <a:font script="Talu" typeface="Microsoft New Tai Lue"/>
+        <a:font script="Tfng" typeface="Ebrima"/>
+      </a:majorFont>
+      <a:minorFont>
+        <a:latin typeface="Calibri" panose="020F0502020204030204"/>
+        <a:ea typeface=""/>
+        <a:cs typeface=""/>
+        <a:font script="Jpan" typeface="游ゴシック"/>
+        <a:font script="Hang" typeface="맑은 고딕"/>
+        <a:font script="Hans" typeface="等线"/>
+        <a:font script="Hant" typeface="新細明體"/>
+        <a:font script="Arab" typeface="Arial"/>
+        <a:font script="Hebr" typeface="Arial"/>
+        <a:font script="Thai" typeface="Cordia New"/>
+        <a:font script="Ethi" typeface="Nyala"/>
+        <a:font script="Beng" typeface="Vrinda"/>
+        <a:font script="Gujr" typeface="Shruti"/>
+        <a:font script="Khmr" typeface="DaunPenh"/>
+        <a:font script="Knda" typeface="Tunga"/>
+        <a:font script="Guru" typeface="Raavi"/>
+        <a:font script="Cans" typeface="Euphemia"/>
+        <a:font script="Cher" typeface="Plantagenet Cherokee"/>
+        <a:font script="Yiii" typeface="Microsoft Yi Baiti"/>
+        <a:font script="Tibt" typeface="Microsoft Himalaya"/>
+        <a:font script="Thaa" typeface="MV Boli"/>
+        <a:font script="Deva" typeface="Mangal"/>
+        <a:font script="Telu" typeface="Gautami"/>
+        <a:font script="Taml" typeface="Latha"/>
+        <a:font script="Syrc" typeface="Estrangelo Edessa"/>
+        <a:font script="Orya" typeface="Kalinga"/>
+        <a:font script="Mlym" typeface="Kartika"/>
+        <a:font script="Laoo" typeface="DokChampa"/>
+        <a:font script="Sinh" typeface="Iskoola Pota"/>
+        <a:font script="Mong" typeface="Mongolian Baiti"/>
+        <a:font script="Viet" typeface="Arial"/>
+        <a:font script="Uigh" typeface="Microsoft Uighur"/>
+        <a:font script="Geor" typeface="Sylfaen"/>
+        <a:font script="Armn" typeface="Arial"/>
+        <a:font script="Bugi" typeface="Leelawadee UI"/>
+        <a:font script="Bopo" typeface="Microsoft JhengHei"/>
+        <a:font script="Java" typeface="Javanese Text"/>
+        <a:font script="Lisu" typeface="Segoe UI"/>
+        <a:font script="Mymr" typeface="Myanmar Text"/>
+        <a:font script="Nkoo" typeface="Ebrima"/>
+        <a:font script="Olck" typeface="Nirmala UI"/>
+        <a:font script="Osma" typeface="Ebrima"/>
+        <a:font script="Phag" typeface="Phagspa"/>
+        <a:font script="Syrn" typeface="Estrangelo Edessa"/>
+        <a:font script="Syrj" typeface="Estrangelo Edessa"/>
+        <a:font script="Syre" typeface="Estrangelo Edessa"/>
+        <a:font script="Sora" typeface="Nirmala UI"/>
+        <a:font script="Tale" typeface="Microsoft Tai Le"/>
+        <a:font script="Talu" typeface="Microsoft New Tai Lue"/>
+        <a:font script="Tfng" typeface="Ebrima"/>
+      </a:minorFont>
+    </a:fontScheme>
+    <a:fmtScheme name="Office">
+      <a:fillStyleLst>
+        <a:solidFill>
+          <a:schemeClr val="phClr"/>
+        </a:solidFill>
+        <a:gradFill rotWithShape="1">
+          <a:gsLst>
+            <a:gs pos="0">
+              <a:schemeClr val="phClr">
+                <a:lumMod val="110000"/>
+                <a:satMod val="105000"/>
+                <a:tint val="67000"/>
+              </a:schemeClr>
+            </a:gs>
+            <a:gs pos="50000">
+              <a:schemeClr val="phClr">
+                <a:lumMod val="105000"/>
+                <a:satMod val="103000"/>
+                <a:tint val="73000"/>
+              </a:schemeClr>
+            </a:gs>
+            <a:gs pos="100000">
+              <a:schemeClr val="phClr">
+                <a:lumMod val="105000"/>
+                <a:satMod val="109000"/>
+                <a:tint val="81000"/>
+              </a:schemeClr>
+            </a:gs>
+          </a:gsLst>
+          <a:lin ang="5400000" scaled="0"/>
+        </a:gradFill>
+        <a:gradFill rotWithShape="1">
+          <a:gsLst>
+            <a:gs pos="0">
+              <a:schemeClr val="phClr">
+                <a:satMod val="103000"/>
+                <a:lumMod val="102000"/>
+                <a:tint val="94000"/>
+              </a:schemeClr>
+            </a:gs>
+            <a:gs pos="50000">
+              <a:schemeClr val="phClr">
+                <a:satMod val="110000"/>
+                <a:lumMod val="100000"/>
+                <a:shade val="100000"/>
+              </a:schemeClr>
+            </a:gs>
+            <a:gs pos="100000">
+              <a:schemeClr val="phClr">
+                <a:lumMod val="99000"/>
+                <a:satMod val="120000"/>
+                <a:shade val="78000"/>
+              </a:schemeClr>
+            </a:gs>
+          </a:gsLst>
+          <a:lin ang="5400000" scaled="0"/>
+        </a:gradFill>
+      </a:fillStyleLst>
+      <a:lnStyleLst>
+        <a:ln w="6350" cap="flat" cmpd="sng" algn="ctr">
+          <a:solidFill>
+            <a:schemeClr val="phClr"/>
+          </a:solidFill>
+          <a:prstDash val="solid"/>
+          <a:miter lim="800000"/>
+        </a:ln>
+        <a:ln w="12700" cap="flat" cmpd="sng" algn="ctr">
+          <a:solidFill>
+            <a:schemeClr val="phClr"/>
+          </a:solidFill>
+          <a:prstDash val="solid"/>
+          <a:miter lim="800000"/>
+        </a:ln>
+        <a:ln w="19050" cap="flat" cmpd="sng" algn="ctr">
+          <a:solidFill>
+            <a:schemeClr val="phClr"/>
+          </a:solidFill>
+          <a:prstDash val="solid"/>
+          <a:miter lim="800000"/>
+        </a:ln>
+      </a:lnStyleLst>
+      <a:effectStyleLst>
+        <a:effectStyle>
+          <a:effectLst/>
+        </a:effectStyle>
+        <a:effectStyle>
+          <a:effectLst/>
+        </a:effectStyle>
+        <a:effectStyle>
+          <a:effectLst>
+            <a:outerShdw blurRad="57150" dist="19050" dir="5400000" algn="ctr" rotWithShape="0">
+              <a:srgbClr val="000000">
+                <a:alpha val="63000"/>
+              </a:srgbClr>
+            </a:outerShdw>
+          </a:effectLst>
+        </a:effectStyle>
+      </a:effectStyleLst>
+      <a:bgFillStyleLst>
+        <a:solidFill>
+          <a:schemeClr val="phClr"/>
+        </a:solidFill>
+        <a:solidFill>
+          <a:schemeClr val="phClr">
+            <a:tint val="95000"/>
+            <a:satMod val="170000"/>
+          </a:schemeClr>
+        </a:solidFill>
+        <a:gradFill rotWithShape="1">
+          <a:gsLst>
+            <a:gs pos="0">
+              <a:schemeClr val="phClr">
+                <a:tint val="93000"/>
+                <a:satMod val="150000"/>
+                <a:shade val="98000"/>
+                <a:lumMod val="102000"/>
+              </a:schemeClr>
+            </a:gs>
+            <a:gs pos="50000">
+              <a:schemeClr val="phClr">
+                <a:tint val="98000"/>
+                <a:satMod val="130000"/>
+                <a:shade val="90000"/>
+                <a:lumMod val="103000"/>
+              </a:schemeClr>
+            </a:gs>
+            <a:gs pos="100000">
+              <a:schemeClr val="phClr">
+                <a:shade val="63000"/>
+                <a:satMod val="120000"/>
+              </a:schemeClr>
+            </a:gs>
+          </a:gsLst>
+          <a:lin ang="5400000" scaled="0"/>
+        </a:gradFill>
+      </a:bgFillStyleLst>
+    </a:fmtScheme>
+  </a:themeElements>
+  <a:objectDefaults/>
+  <a:extraClrSchemeLst/>
+  <a:extLst>
+    <a:ext uri="{05A4C25C-085E-4340-85A3-A5531E510DB2}">
+      <thm15:themeFamily xmlns:thm15="http://schemas.microsoft.com/office/thememl/2012/main" name="Office Theme" id="{62F939B6-93AF-4DB8-9C6B-D6C7DFDC589F}" vid="{4A3C46E8-61CC-4603-A589-7422A47A8E4A}"/>
+    </a:ext>
+  </a:extLst>
+</a:theme>
 </file>
</xml_diff>